<commit_message>
Minor fixes to some slides.
</commit_message>
<xml_diff>
--- a/Presentation/AzureDeployAndDebug/AzureDeployAndDebug.pptx
+++ b/Presentation/AzureDeployAndDebug/AzureDeployAndDebug.pptx
@@ -220,7 +220,7 @@
           <a:p>
             <a:fld id="{312E7B4A-039C-48A2-9B2C-AF16AA3873D8}" type="datetimeFigureOut">
               <a:rPr lang="en-US" smtClean="0"/>
-              <a:t>22/07/2015</a:t>
+              <a:t>7/23/2015</a:t>
             </a:fld>
             <a:endParaRPr lang="en-US"/>
           </a:p>
@@ -385,7 +385,7 @@
           <a:p>
             <a:fld id="{DA005A0C-54D9-45AA-87D4-C551D08DFCE1}" type="datetimeFigureOut">
               <a:rPr lang="en-US" smtClean="0"/>
-              <a:t>22/07/2015</a:t>
+              <a:t>7/23/2015</a:t>
             </a:fld>
             <a:endParaRPr lang="en-US"/>
           </a:p>
@@ -17393,7 +17393,15 @@
           <a:p>
             <a:r>
               <a:rPr lang="en-US" dirty="0" smtClean="0"/>
-              <a:t>Remote Debugging a node application with Visual Studio and Azure</a:t>
+              <a:t>Remote Debugging a </a:t>
+            </a:r>
+            <a:r>
+              <a:rPr lang="en-US" dirty="0" smtClean="0"/>
+              <a:t>Node.js </a:t>
+            </a:r>
+            <a:r>
+              <a:rPr lang="en-US" dirty="0" smtClean="0"/>
+              <a:t>application with Visual Studio and Azure</a:t>
             </a:r>
             <a:endParaRPr lang="en-US" dirty="0"/>
           </a:p>
@@ -17761,7 +17769,15 @@
             </a:r>
             <a:r>
               <a:rPr lang="en-US" dirty="0" smtClean="0"/>
-              <a:t>, asp.net etc..</a:t>
+              <a:t>, </a:t>
+            </a:r>
+            <a:r>
+              <a:rPr lang="en-US" dirty="0" smtClean="0"/>
+              <a:t>asp.net, </a:t>
+            </a:r>
+            <a:r>
+              <a:rPr lang="en-US" dirty="0" smtClean="0"/>
+              <a:t>etc..</a:t>
             </a:r>
           </a:p>
           <a:p>
@@ -20264,12 +20280,6 @@
 </file>
 
 <file path=customXml/item1.xml><?xml version="1.0" encoding="utf-8"?>
-<p:properties xmlns:p="http://schemas.microsoft.com/office/2006/metadata/properties" xmlns:xsi="http://www.w3.org/2001/XMLSchema-instance" xmlns:pc="http://schemas.microsoft.com/office/infopath/2007/PartnerControls">
-  <documentManagement/>
-</p:properties>
-</file>
-
-<file path=customXml/item2.xml><?xml version="1.0" encoding="utf-8"?>
 <ct:contentTypeSchema xmlns:ct="http://schemas.microsoft.com/office/2006/metadata/contentType" xmlns:ma="http://schemas.microsoft.com/office/2006/metadata/properties/metaAttributes" ct:_="" ma:_="" ma:contentTypeName="Document" ma:contentTypeID="0x010100391E57C78B9F604FB8BAD296D1460E2A" ma:contentTypeVersion="1" ma:contentTypeDescription="Create a new document." ma:contentTypeScope="" ma:versionID="fb382fe2362acd2155f454904f478e4d">
   <xsd:schema xmlns:xsd="http://www.w3.org/2001/XMLSchema" xmlns:xs="http://www.w3.org/2001/XMLSchema" xmlns:p="http://schemas.microsoft.com/office/2006/metadata/properties" xmlns:ns3="636b0322-90fb-440c-9cbc-22749e7231e9" targetNamespace="http://schemas.microsoft.com/office/2006/metadata/properties" ma:root="true" ma:fieldsID="b9887c63ce4710c1aeb75a5f03aecb69" ns3:_="">
     <xsd:import namespace="636b0322-90fb-440c-9cbc-22749e7231e9"/>
@@ -20409,6 +20419,12 @@
 </ct:contentTypeSchema>
 </file>
 
+<file path=customXml/item2.xml><?xml version="1.0" encoding="utf-8"?>
+<p:properties xmlns:p="http://schemas.microsoft.com/office/2006/metadata/properties" xmlns:xsi="http://www.w3.org/2001/XMLSchema-instance" xmlns:pc="http://schemas.microsoft.com/office/infopath/2007/PartnerControls">
+  <documentManagement/>
+</p:properties>
+</file>
+
 <file path=customXml/item3.xml><?xml version="1.0" encoding="utf-8"?>
 <?mso-contentType ?>
 <FormTemplates xmlns="http://schemas.microsoft.com/sharepoint/v3/contenttype/forms">
@@ -20419,22 +20435,6 @@
 </file>
 
 <file path=customXml/itemProps1.xml><?xml version="1.0" encoding="utf-8"?>
-<ds:datastoreItem xmlns:ds="http://schemas.openxmlformats.org/officeDocument/2006/customXml" ds:itemID="{7025FDD9-4C58-4084-9F89-0E6ADD6FFF55}">
-  <ds:schemaRefs>
-    <ds:schemaRef ds:uri="http://purl.org/dc/elements/1.1/"/>
-    <ds:schemaRef ds:uri="http://schemas.microsoft.com/office/2006/metadata/properties"/>
-    <ds:schemaRef ds:uri="636b0322-90fb-440c-9cbc-22749e7231e9"/>
-    <ds:schemaRef ds:uri="http://purl.org/dc/terms/"/>
-    <ds:schemaRef ds:uri="http://schemas.openxmlformats.org/package/2006/metadata/core-properties"/>
-    <ds:schemaRef ds:uri="http://schemas.microsoft.com/office/2006/documentManagement/types"/>
-    <ds:schemaRef ds:uri="http://schemas.microsoft.com/office/infopath/2007/PartnerControls"/>
-    <ds:schemaRef ds:uri="http://www.w3.org/XML/1998/namespace"/>
-    <ds:schemaRef ds:uri="http://purl.org/dc/dcmitype/"/>
-  </ds:schemaRefs>
-</ds:datastoreItem>
-</file>
-
-<file path=customXml/itemProps2.xml><?xml version="1.0" encoding="utf-8"?>
 <ds:datastoreItem xmlns:ds="http://schemas.openxmlformats.org/officeDocument/2006/customXml" ds:itemID="{7B70CE0C-0988-423A-BF66-B40F6A1061FF}">
   <ds:schemaRefs>
     <ds:schemaRef ds:uri="http://schemas.microsoft.com/office/2006/metadata/contentType"/>
@@ -20452,6 +20452,22 @@
 </ds:datastoreItem>
 </file>
 
+<file path=customXml/itemProps2.xml><?xml version="1.0" encoding="utf-8"?>
+<ds:datastoreItem xmlns:ds="http://schemas.openxmlformats.org/officeDocument/2006/customXml" ds:itemID="{7025FDD9-4C58-4084-9F89-0E6ADD6FFF55}">
+  <ds:schemaRefs>
+    <ds:schemaRef ds:uri="http://purl.org/dc/elements/1.1/"/>
+    <ds:schemaRef ds:uri="http://schemas.microsoft.com/office/2006/metadata/properties"/>
+    <ds:schemaRef ds:uri="636b0322-90fb-440c-9cbc-22749e7231e9"/>
+    <ds:schemaRef ds:uri="http://purl.org/dc/terms/"/>
+    <ds:schemaRef ds:uri="http://schemas.openxmlformats.org/package/2006/metadata/core-properties"/>
+    <ds:schemaRef ds:uri="http://schemas.microsoft.com/office/2006/documentManagement/types"/>
+    <ds:schemaRef ds:uri="http://schemas.microsoft.com/office/infopath/2007/PartnerControls"/>
+    <ds:schemaRef ds:uri="http://www.w3.org/XML/1998/namespace"/>
+    <ds:schemaRef ds:uri="http://purl.org/dc/dcmitype/"/>
+  </ds:schemaRefs>
+</ds:datastoreItem>
+</file>
+
 <file path=customXml/itemProps3.xml><?xml version="1.0" encoding="utf-8"?>
 <ds:datastoreItem xmlns:ds="http://schemas.openxmlformats.org/officeDocument/2006/customXml" ds:itemID="{B0CA13EC-1D3C-4D6F-8D1C-E8A452CFC79A}">
   <ds:schemaRefs>

</xml_diff>

<commit_message>
Created AzureDeployAndDebug reveal.js presentation
</commit_message>
<xml_diff>
--- a/Presentation/AzureDeployAndDebug/AzureDeployAndDebug.pptx
+++ b/Presentation/AzureDeployAndDebug/AzureDeployAndDebug.pptx
@@ -226,7 +226,7 @@
           <a:p>
             <a:fld id="{312E7B4A-039C-48A2-9B2C-AF16AA3873D8}" type="datetimeFigureOut">
               <a:rPr lang="en-US" smtClean="0"/>
-              <a:t>23/07/2015</a:t>
+              <a:t>1/27/2016</a:t>
             </a:fld>
             <a:endParaRPr lang="en-US"/>
           </a:p>
@@ -391,7 +391,7 @@
           <a:p>
             <a:fld id="{DA005A0C-54D9-45AA-87D4-C551D08DFCE1}" type="datetimeFigureOut">
               <a:rPr lang="en-US" smtClean="0"/>
-              <a:t>23/07/2015</a:t>
+              <a:t>1/27/2016</a:t>
             </a:fld>
             <a:endParaRPr lang="en-US"/>
           </a:p>
@@ -1332,7 +1332,7 @@
                 </a:solidFill>
               </a:rPr>
               <a:pPr/>
-              <a:t>23/07/2015</a:t>
+              <a:t>1/27/2016</a:t>
             </a:fld>
             <a:endParaRPr lang="en-US" dirty="0">
               <a:solidFill>
@@ -1558,10 +1558,34 @@
                 <a:tableStyleId>{5C22544A-7EE6-4342-B048-85BDC9FD1C3A}</a:tableStyleId>
               </a:tblPr>
               <a:tblGrid>
-                <a:gridCol w="2764105"/>
-                <a:gridCol w="2764105"/>
-                <a:gridCol w="2764105"/>
-                <a:gridCol w="2764105"/>
+                <a:gridCol w="2764105">
+                  <a:extLst>
+                    <a:ext uri="{9D8B030D-6E8A-4147-A177-3AD203B41FA5}">
+                      <a16:colId xmlns:a16="http://schemas.microsoft.com/office/drawing/2014/main" val="20000"/>
+                    </a:ext>
+                  </a:extLst>
+                </a:gridCol>
+                <a:gridCol w="2764105">
+                  <a:extLst>
+                    <a:ext uri="{9D8B030D-6E8A-4147-A177-3AD203B41FA5}">
+                      <a16:colId xmlns:a16="http://schemas.microsoft.com/office/drawing/2014/main" val="20001"/>
+                    </a:ext>
+                  </a:extLst>
+                </a:gridCol>
+                <a:gridCol w="2764105">
+                  <a:extLst>
+                    <a:ext uri="{9D8B030D-6E8A-4147-A177-3AD203B41FA5}">
+                      <a16:colId xmlns:a16="http://schemas.microsoft.com/office/drawing/2014/main" val="20002"/>
+                    </a:ext>
+                  </a:extLst>
+                </a:gridCol>
+                <a:gridCol w="2764105">
+                  <a:extLst>
+                    <a:ext uri="{9D8B030D-6E8A-4147-A177-3AD203B41FA5}">
+                      <a16:colId xmlns:a16="http://schemas.microsoft.com/office/drawing/2014/main" val="20003"/>
+                    </a:ext>
+                  </a:extLst>
+                </a:gridCol>
               </a:tblGrid>
               <a:tr h="644435">
                 <a:tc>
@@ -1736,6 +1760,11 @@
                     </a:lnBlToTr>
                   </a:tcPr>
                 </a:tc>
+                <a:extLst>
+                  <a:ext uri="{0D108BD9-81ED-4DB2-BD59-A6C34878D82A}">
+                    <a16:rowId xmlns:a16="http://schemas.microsoft.com/office/drawing/2014/main" val="10000"/>
+                  </a:ext>
+                </a:extLst>
               </a:tr>
               <a:tr h="1225319">
                 <a:tc>
@@ -1967,6 +1996,11 @@
                     </a:lnBlToTr>
                   </a:tcPr>
                 </a:tc>
+                <a:extLst>
+                  <a:ext uri="{0D108BD9-81ED-4DB2-BD59-A6C34878D82A}">
+                    <a16:rowId xmlns:a16="http://schemas.microsoft.com/office/drawing/2014/main" val="10001"/>
+                  </a:ext>
+                </a:extLst>
               </a:tr>
               <a:tr h="1225319">
                 <a:tc>
@@ -2217,6 +2251,11 @@
                     </a:lnBlToTr>
                   </a:tcPr>
                 </a:tc>
+                <a:extLst>
+                  <a:ext uri="{0D108BD9-81ED-4DB2-BD59-A6C34878D82A}">
+                    <a16:rowId xmlns:a16="http://schemas.microsoft.com/office/drawing/2014/main" val="10002"/>
+                  </a:ext>
+                </a:extLst>
               </a:tr>
               <a:tr h="1225319">
                 <a:tc>
@@ -2467,6 +2506,11 @@
                     </a:lnBlToTr>
                   </a:tcPr>
                 </a:tc>
+                <a:extLst>
+                  <a:ext uri="{0D108BD9-81ED-4DB2-BD59-A6C34878D82A}">
+                    <a16:rowId xmlns:a16="http://schemas.microsoft.com/office/drawing/2014/main" val="10003"/>
+                  </a:ext>
+                </a:extLst>
               </a:tr>
             </a:tbl>
           </a:graphicData>
@@ -4460,10 +4504,34 @@
                 <a:tableStyleId>{93296810-A885-4BE3-A3E7-6D5BEEA58F35}</a:tableStyleId>
               </a:tblPr>
               <a:tblGrid>
-                <a:gridCol w="2764105"/>
-                <a:gridCol w="2764105"/>
-                <a:gridCol w="2764105"/>
-                <a:gridCol w="2764105"/>
+                <a:gridCol w="2764105">
+                  <a:extLst>
+                    <a:ext uri="{9D8B030D-6E8A-4147-A177-3AD203B41FA5}">
+                      <a16:colId xmlns:a16="http://schemas.microsoft.com/office/drawing/2014/main" val="20000"/>
+                    </a:ext>
+                  </a:extLst>
+                </a:gridCol>
+                <a:gridCol w="2764105">
+                  <a:extLst>
+                    <a:ext uri="{9D8B030D-6E8A-4147-A177-3AD203B41FA5}">
+                      <a16:colId xmlns:a16="http://schemas.microsoft.com/office/drawing/2014/main" val="20001"/>
+                    </a:ext>
+                  </a:extLst>
+                </a:gridCol>
+                <a:gridCol w="2764105">
+                  <a:extLst>
+                    <a:ext uri="{9D8B030D-6E8A-4147-A177-3AD203B41FA5}">
+                      <a16:colId xmlns:a16="http://schemas.microsoft.com/office/drawing/2014/main" val="20002"/>
+                    </a:ext>
+                  </a:extLst>
+                </a:gridCol>
+                <a:gridCol w="2764105">
+                  <a:extLst>
+                    <a:ext uri="{9D8B030D-6E8A-4147-A177-3AD203B41FA5}">
+                      <a16:colId xmlns:a16="http://schemas.microsoft.com/office/drawing/2014/main" val="20003"/>
+                    </a:ext>
+                  </a:extLst>
+                </a:gridCol>
               </a:tblGrid>
               <a:tr h="644435">
                 <a:tc>
@@ -4622,6 +4690,11 @@
                     </a:lnBlToTr>
                   </a:tcPr>
                 </a:tc>
+                <a:extLst>
+                  <a:ext uri="{0D108BD9-81ED-4DB2-BD59-A6C34878D82A}">
+                    <a16:rowId xmlns:a16="http://schemas.microsoft.com/office/drawing/2014/main" val="10000"/>
+                  </a:ext>
+                </a:extLst>
               </a:tr>
               <a:tr h="1225319">
                 <a:tc>
@@ -4837,6 +4910,11 @@
                     </a:lnBlToTr>
                   </a:tcPr>
                 </a:tc>
+                <a:extLst>
+                  <a:ext uri="{0D108BD9-81ED-4DB2-BD59-A6C34878D82A}">
+                    <a16:rowId xmlns:a16="http://schemas.microsoft.com/office/drawing/2014/main" val="10001"/>
+                  </a:ext>
+                </a:extLst>
               </a:tr>
               <a:tr h="1225319">
                 <a:tc>
@@ -5071,6 +5149,11 @@
                     </a:lnBlToTr>
                   </a:tcPr>
                 </a:tc>
+                <a:extLst>
+                  <a:ext uri="{0D108BD9-81ED-4DB2-BD59-A6C34878D82A}">
+                    <a16:rowId xmlns:a16="http://schemas.microsoft.com/office/drawing/2014/main" val="10002"/>
+                  </a:ext>
+                </a:extLst>
               </a:tr>
               <a:tr h="1225319">
                 <a:tc>
@@ -5305,6 +5388,11 @@
                     </a:lnBlToTr>
                   </a:tcPr>
                 </a:tc>
+                <a:extLst>
+                  <a:ext uri="{0D108BD9-81ED-4DB2-BD59-A6C34878D82A}">
+                    <a16:rowId xmlns:a16="http://schemas.microsoft.com/office/drawing/2014/main" val="10003"/>
+                  </a:ext>
+                </a:extLst>
               </a:tr>
             </a:tbl>
           </a:graphicData>
@@ -6177,10 +6265,34 @@
                 <a:tableStyleId>{21E4AEA4-8DFA-4A89-87EB-49C32662AFE0}</a:tableStyleId>
               </a:tblPr>
               <a:tblGrid>
-                <a:gridCol w="2764105"/>
-                <a:gridCol w="2764105"/>
-                <a:gridCol w="2764105"/>
-                <a:gridCol w="2764105"/>
+                <a:gridCol w="2764105">
+                  <a:extLst>
+                    <a:ext uri="{9D8B030D-6E8A-4147-A177-3AD203B41FA5}">
+                      <a16:colId xmlns:a16="http://schemas.microsoft.com/office/drawing/2014/main" val="20000"/>
+                    </a:ext>
+                  </a:extLst>
+                </a:gridCol>
+                <a:gridCol w="2764105">
+                  <a:extLst>
+                    <a:ext uri="{9D8B030D-6E8A-4147-A177-3AD203B41FA5}">
+                      <a16:colId xmlns:a16="http://schemas.microsoft.com/office/drawing/2014/main" val="20001"/>
+                    </a:ext>
+                  </a:extLst>
+                </a:gridCol>
+                <a:gridCol w="2764105">
+                  <a:extLst>
+                    <a:ext uri="{9D8B030D-6E8A-4147-A177-3AD203B41FA5}">
+                      <a16:colId xmlns:a16="http://schemas.microsoft.com/office/drawing/2014/main" val="20002"/>
+                    </a:ext>
+                  </a:extLst>
+                </a:gridCol>
+                <a:gridCol w="2764105">
+                  <a:extLst>
+                    <a:ext uri="{9D8B030D-6E8A-4147-A177-3AD203B41FA5}">
+                      <a16:colId xmlns:a16="http://schemas.microsoft.com/office/drawing/2014/main" val="20003"/>
+                    </a:ext>
+                  </a:extLst>
+                </a:gridCol>
               </a:tblGrid>
               <a:tr h="644435">
                 <a:tc>
@@ -6351,6 +6463,11 @@
                     </a:solidFill>
                   </a:tcPr>
                 </a:tc>
+                <a:extLst>
+                  <a:ext uri="{0D108BD9-81ED-4DB2-BD59-A6C34878D82A}">
+                    <a16:rowId xmlns:a16="http://schemas.microsoft.com/office/drawing/2014/main" val="10000"/>
+                  </a:ext>
+                </a:extLst>
               </a:tr>
               <a:tr h="1225319">
                 <a:tc>
@@ -6578,6 +6695,11 @@
                     </a:solidFill>
                   </a:tcPr>
                 </a:tc>
+                <a:extLst>
+                  <a:ext uri="{0D108BD9-81ED-4DB2-BD59-A6C34878D82A}">
+                    <a16:rowId xmlns:a16="http://schemas.microsoft.com/office/drawing/2014/main" val="10001"/>
+                  </a:ext>
+                </a:extLst>
               </a:tr>
               <a:tr h="1225319">
                 <a:tc>
@@ -6832,6 +6954,11 @@
                     </a:solidFill>
                   </a:tcPr>
                 </a:tc>
+                <a:extLst>
+                  <a:ext uri="{0D108BD9-81ED-4DB2-BD59-A6C34878D82A}">
+                    <a16:rowId xmlns:a16="http://schemas.microsoft.com/office/drawing/2014/main" val="10002"/>
+                  </a:ext>
+                </a:extLst>
               </a:tr>
               <a:tr h="1225319">
                 <a:tc>
@@ -7078,6 +7205,11 @@
                     </a:solidFill>
                   </a:tcPr>
                 </a:tc>
+                <a:extLst>
+                  <a:ext uri="{0D108BD9-81ED-4DB2-BD59-A6C34878D82A}">
+                    <a16:rowId xmlns:a16="http://schemas.microsoft.com/office/drawing/2014/main" val="10003"/>
+                  </a:ext>
+                </a:extLst>
               </a:tr>
             </a:tbl>
           </a:graphicData>
@@ -8136,10 +8268,34 @@
                 <a:tableStyleId>{5C22544A-7EE6-4342-B048-85BDC9FD1C3A}</a:tableStyleId>
               </a:tblPr>
               <a:tblGrid>
-                <a:gridCol w="2764105"/>
-                <a:gridCol w="2764105"/>
-                <a:gridCol w="2764105"/>
-                <a:gridCol w="2764105"/>
+                <a:gridCol w="2764105">
+                  <a:extLst>
+                    <a:ext uri="{9D8B030D-6E8A-4147-A177-3AD203B41FA5}">
+                      <a16:colId xmlns:a16="http://schemas.microsoft.com/office/drawing/2014/main" val="20000"/>
+                    </a:ext>
+                  </a:extLst>
+                </a:gridCol>
+                <a:gridCol w="2764105">
+                  <a:extLst>
+                    <a:ext uri="{9D8B030D-6E8A-4147-A177-3AD203B41FA5}">
+                      <a16:colId xmlns:a16="http://schemas.microsoft.com/office/drawing/2014/main" val="20001"/>
+                    </a:ext>
+                  </a:extLst>
+                </a:gridCol>
+                <a:gridCol w="2764105">
+                  <a:extLst>
+                    <a:ext uri="{9D8B030D-6E8A-4147-A177-3AD203B41FA5}">
+                      <a16:colId xmlns:a16="http://schemas.microsoft.com/office/drawing/2014/main" val="20002"/>
+                    </a:ext>
+                  </a:extLst>
+                </a:gridCol>
+                <a:gridCol w="2764105">
+                  <a:extLst>
+                    <a:ext uri="{9D8B030D-6E8A-4147-A177-3AD203B41FA5}">
+                      <a16:colId xmlns:a16="http://schemas.microsoft.com/office/drawing/2014/main" val="20003"/>
+                    </a:ext>
+                  </a:extLst>
+                </a:gridCol>
               </a:tblGrid>
               <a:tr h="644435">
                 <a:tc>
@@ -8314,6 +8470,11 @@
                     </a:lnBlToTr>
                   </a:tcPr>
                 </a:tc>
+                <a:extLst>
+                  <a:ext uri="{0D108BD9-81ED-4DB2-BD59-A6C34878D82A}">
+                    <a16:rowId xmlns:a16="http://schemas.microsoft.com/office/drawing/2014/main" val="10000"/>
+                  </a:ext>
+                </a:extLst>
               </a:tr>
               <a:tr h="1225319">
                 <a:tc>
@@ -8545,6 +8706,11 @@
                     </a:lnBlToTr>
                   </a:tcPr>
                 </a:tc>
+                <a:extLst>
+                  <a:ext uri="{0D108BD9-81ED-4DB2-BD59-A6C34878D82A}">
+                    <a16:rowId xmlns:a16="http://schemas.microsoft.com/office/drawing/2014/main" val="10001"/>
+                  </a:ext>
+                </a:extLst>
               </a:tr>
               <a:tr h="1225319">
                 <a:tc>
@@ -8795,6 +8961,11 @@
                     </a:lnBlToTr>
                   </a:tcPr>
                 </a:tc>
+                <a:extLst>
+                  <a:ext uri="{0D108BD9-81ED-4DB2-BD59-A6C34878D82A}">
+                    <a16:rowId xmlns:a16="http://schemas.microsoft.com/office/drawing/2014/main" val="10002"/>
+                  </a:ext>
+                </a:extLst>
               </a:tr>
               <a:tr h="1225319">
                 <a:tc>
@@ -9045,6 +9216,11 @@
                     </a:lnBlToTr>
                   </a:tcPr>
                 </a:tc>
+                <a:extLst>
+                  <a:ext uri="{0D108BD9-81ED-4DB2-BD59-A6C34878D82A}">
+                    <a16:rowId xmlns:a16="http://schemas.microsoft.com/office/drawing/2014/main" val="10003"/>
+                  </a:ext>
+                </a:extLst>
               </a:tr>
             </a:tbl>
           </a:graphicData>
@@ -10026,10 +10202,34 @@
                 <a:tableStyleId>{5C22544A-7EE6-4342-B048-85BDC9FD1C3A}</a:tableStyleId>
               </a:tblPr>
               <a:tblGrid>
-                <a:gridCol w="2764105"/>
-                <a:gridCol w="2764105"/>
-                <a:gridCol w="2764105"/>
-                <a:gridCol w="2764105"/>
+                <a:gridCol w="2764105">
+                  <a:extLst>
+                    <a:ext uri="{9D8B030D-6E8A-4147-A177-3AD203B41FA5}">
+                      <a16:colId xmlns:a16="http://schemas.microsoft.com/office/drawing/2014/main" val="20000"/>
+                    </a:ext>
+                  </a:extLst>
+                </a:gridCol>
+                <a:gridCol w="2764105">
+                  <a:extLst>
+                    <a:ext uri="{9D8B030D-6E8A-4147-A177-3AD203B41FA5}">
+                      <a16:colId xmlns:a16="http://schemas.microsoft.com/office/drawing/2014/main" val="20001"/>
+                    </a:ext>
+                  </a:extLst>
+                </a:gridCol>
+                <a:gridCol w="2764105">
+                  <a:extLst>
+                    <a:ext uri="{9D8B030D-6E8A-4147-A177-3AD203B41FA5}">
+                      <a16:colId xmlns:a16="http://schemas.microsoft.com/office/drawing/2014/main" val="20002"/>
+                    </a:ext>
+                  </a:extLst>
+                </a:gridCol>
+                <a:gridCol w="2764105">
+                  <a:extLst>
+                    <a:ext uri="{9D8B030D-6E8A-4147-A177-3AD203B41FA5}">
+                      <a16:colId xmlns:a16="http://schemas.microsoft.com/office/drawing/2014/main" val="20003"/>
+                    </a:ext>
+                  </a:extLst>
+                </a:gridCol>
               </a:tblGrid>
               <a:tr h="644435">
                 <a:tc>
@@ -10204,6 +10404,11 @@
                     </a:lnBlToTr>
                   </a:tcPr>
                 </a:tc>
+                <a:extLst>
+                  <a:ext uri="{0D108BD9-81ED-4DB2-BD59-A6C34878D82A}">
+                    <a16:rowId xmlns:a16="http://schemas.microsoft.com/office/drawing/2014/main" val="10000"/>
+                  </a:ext>
+                </a:extLst>
               </a:tr>
               <a:tr h="1225319">
                 <a:tc>
@@ -10435,6 +10640,11 @@
                     </a:lnBlToTr>
                   </a:tcPr>
                 </a:tc>
+                <a:extLst>
+                  <a:ext uri="{0D108BD9-81ED-4DB2-BD59-A6C34878D82A}">
+                    <a16:rowId xmlns:a16="http://schemas.microsoft.com/office/drawing/2014/main" val="10001"/>
+                  </a:ext>
+                </a:extLst>
               </a:tr>
               <a:tr h="1225319">
                 <a:tc>
@@ -10685,6 +10895,11 @@
                     </a:lnBlToTr>
                   </a:tcPr>
                 </a:tc>
+                <a:extLst>
+                  <a:ext uri="{0D108BD9-81ED-4DB2-BD59-A6C34878D82A}">
+                    <a16:rowId xmlns:a16="http://schemas.microsoft.com/office/drawing/2014/main" val="10002"/>
+                  </a:ext>
+                </a:extLst>
               </a:tr>
               <a:tr h="1225319">
                 <a:tc>
@@ -10935,6 +11150,11 @@
                     </a:lnBlToTr>
                   </a:tcPr>
                 </a:tc>
+                <a:extLst>
+                  <a:ext uri="{0D108BD9-81ED-4DB2-BD59-A6C34878D82A}">
+                    <a16:rowId xmlns:a16="http://schemas.microsoft.com/office/drawing/2014/main" val="10003"/>
+                  </a:ext>
+                </a:extLst>
               </a:tr>
             </a:tbl>
           </a:graphicData>
@@ -17891,13 +18111,13 @@
   <p:clrMapOvr>
     <a:masterClrMapping/>
   </p:clrMapOvr>
-  <mc:AlternateContent xmlns:mc="http://schemas.openxmlformats.org/markup-compatibility/2006">
-    <mc:Choice xmlns:p14="http://schemas.microsoft.com/office/powerpoint/2010/main" Requires="p14">
+  <mc:AlternateContent xmlns:mc="http://schemas.openxmlformats.org/markup-compatibility/2006" xmlns:p14="http://schemas.microsoft.com/office/powerpoint/2010/main">
+    <mc:Choice Requires="p14">
       <p:transition spd="med" p14:dur="700">
         <p:fade/>
       </p:transition>
     </mc:Choice>
-    <mc:Fallback>
+    <mc:Fallback xmlns="">
       <p:transition spd="med">
         <p:fade/>
       </p:transition>
@@ -17952,8 +18172,8 @@
               <a:t>Deploying to Azure with </a:t>
             </a:r>
             <a:r>
-              <a:rPr lang="en-US" dirty="0" err="1"/>
-              <a:t>Github</a:t>
+              <a:rPr lang="en-US" dirty="0"/>
+              <a:t>GitHub</a:t>
             </a:r>
             <a:endParaRPr lang="en-US" dirty="0"/>
           </a:p>
@@ -17969,13 +18189,13 @@
   <p:clrMapOvr>
     <a:masterClrMapping/>
   </p:clrMapOvr>
-  <mc:AlternateContent xmlns:mc="http://schemas.openxmlformats.org/markup-compatibility/2006">
-    <mc:Choice xmlns:p14="http://schemas.microsoft.com/office/powerpoint/2010/main" Requires="p14">
+  <mc:AlternateContent xmlns:mc="http://schemas.openxmlformats.org/markup-compatibility/2006" xmlns:p14="http://schemas.microsoft.com/office/powerpoint/2010/main">
+    <mc:Choice Requires="p14">
       <p:transition spd="med" p14:dur="700">
         <p:fade/>
       </p:transition>
     </mc:Choice>
-    <mc:Fallback>
+    <mc:Fallback xmlns="">
       <p:transition spd="med">
         <p:fade/>
       </p:transition>
@@ -18358,7 +18578,7 @@
         </p:nvSpPr>
         <p:spPr>
           <a:xfrm>
-            <a:off x="5306144" y="1908367"/>
+            <a:off x="5295985" y="2000700"/>
             <a:ext cx="5621219" cy="461665"/>
           </a:xfrm>
           <a:prstGeom prst="rect">
@@ -18704,13 +18924,13 @@
   <p:clrMapOvr>
     <a:masterClrMapping/>
   </p:clrMapOvr>
-  <mc:AlternateContent xmlns:mc="http://schemas.openxmlformats.org/markup-compatibility/2006">
-    <mc:Choice xmlns:p14="http://schemas.microsoft.com/office/powerpoint/2010/main" Requires="p14">
+  <mc:AlternateContent xmlns:mc="http://schemas.openxmlformats.org/markup-compatibility/2006" xmlns:p14="http://schemas.microsoft.com/office/powerpoint/2010/main">
+    <mc:Choice Requires="p14">
       <p:transition spd="med" p14:dur="700">
         <p:fade/>
       </p:transition>
     </mc:Choice>
-    <mc:Fallback>
+    <mc:Fallback xmlns="">
       <p:transition spd="med">
         <p:fade/>
       </p:transition>
@@ -19337,13 +19557,13 @@
   <p:clrMapOvr>
     <a:masterClrMapping/>
   </p:clrMapOvr>
-  <mc:AlternateContent xmlns:mc="http://schemas.openxmlformats.org/markup-compatibility/2006">
-    <mc:Choice xmlns:p14="http://schemas.microsoft.com/office/powerpoint/2010/main" Requires="p14">
+  <mc:AlternateContent xmlns:mc="http://schemas.openxmlformats.org/markup-compatibility/2006" xmlns:p14="http://schemas.microsoft.com/office/powerpoint/2010/main">
+    <mc:Choice Requires="p14">
       <p:transition spd="med" p14:dur="700">
         <p:fade/>
       </p:transition>
     </mc:Choice>
-    <mc:Fallback>
+    <mc:Fallback xmlns="">
       <p:transition spd="med">
         <p:fade/>
       </p:transition>
@@ -19433,13 +19653,13 @@
   <p:clrMapOvr>
     <a:masterClrMapping/>
   </p:clrMapOvr>
-  <mc:AlternateContent xmlns:mc="http://schemas.openxmlformats.org/markup-compatibility/2006">
-    <mc:Choice xmlns:p14="http://schemas.microsoft.com/office/powerpoint/2010/main" Requires="p14">
+  <mc:AlternateContent xmlns:mc="http://schemas.openxmlformats.org/markup-compatibility/2006" xmlns:p14="http://schemas.microsoft.com/office/powerpoint/2010/main">
+    <mc:Choice Requires="p14">
       <p:transition spd="med" p14:dur="700">
         <p:fade/>
       </p:transition>
     </mc:Choice>
-    <mc:Fallback>
+    <mc:Fallback xmlns="">
       <p:transition spd="med">
         <p:fade/>
       </p:transition>
@@ -19492,8 +19712,8 @@
               <a:t>Deploying to Azure with </a:t>
             </a:r>
             <a:r>
-              <a:rPr lang="en-US" dirty="0" err="1"/>
-              <a:t>Github</a:t>
+              <a:rPr lang="en-US" dirty="0"/>
+              <a:t>GitHub</a:t>
             </a:r>
             <a:endParaRPr lang="en-US" dirty="0"/>
           </a:p>
@@ -19509,13 +19729,13 @@
   <p:clrMapOvr>
     <a:masterClrMapping/>
   </p:clrMapOvr>
-  <mc:AlternateContent xmlns:mc="http://schemas.openxmlformats.org/markup-compatibility/2006">
-    <mc:Choice xmlns:p14="http://schemas.microsoft.com/office/powerpoint/2010/main" Requires="p14">
+  <mc:AlternateContent xmlns:mc="http://schemas.openxmlformats.org/markup-compatibility/2006" xmlns:p14="http://schemas.microsoft.com/office/powerpoint/2010/main">
+    <mc:Choice Requires="p14">
       <p:transition spd="med" p14:dur="700">
         <p:fade/>
       </p:transition>
     </mc:Choice>
-    <mc:Fallback>
+    <mc:Fallback xmlns="">
       <p:transition spd="med">
         <p:fade/>
       </p:transition>
@@ -19597,13 +19817,13 @@
   <p:clrMapOvr>
     <a:masterClrMapping/>
   </p:clrMapOvr>
-  <mc:AlternateContent xmlns:mc="http://schemas.openxmlformats.org/markup-compatibility/2006">
-    <mc:Choice xmlns:p14="http://schemas.microsoft.com/office/powerpoint/2010/main" Requires="p14">
+  <mc:AlternateContent xmlns:mc="http://schemas.openxmlformats.org/markup-compatibility/2006" xmlns:p14="http://schemas.microsoft.com/office/powerpoint/2010/main">
+    <mc:Choice Requires="p14">
       <p:transition spd="med" p14:dur="700">
         <p:fade/>
       </p:transition>
     </mc:Choice>
-    <mc:Fallback>
+    <mc:Fallback xmlns="">
       <p:transition spd="med">
         <p:fade/>
       </p:transition>
@@ -19669,13 +19889,13 @@
   <p:clrMapOvr>
     <a:masterClrMapping/>
   </p:clrMapOvr>
-  <mc:AlternateContent xmlns:mc="http://schemas.openxmlformats.org/markup-compatibility/2006">
-    <mc:Choice xmlns:p14="http://schemas.microsoft.com/office/powerpoint/2010/main" Requires="p14">
+  <mc:AlternateContent xmlns:mc="http://schemas.openxmlformats.org/markup-compatibility/2006" xmlns:p14="http://schemas.microsoft.com/office/powerpoint/2010/main">
+    <mc:Choice Requires="p14">
       <p:transition spd="med" p14:dur="700">
         <p:fade/>
       </p:transition>
     </mc:Choice>
-    <mc:Fallback>
+    <mc:Fallback xmlns="">
       <p:transition spd="med">
         <p:fade/>
       </p:transition>
@@ -20247,7 +20467,7 @@
                 <a:buNone/>
               </a:pPr>
               <a:r>
-                <a:rPr lang="en-US" sz="4000" smtClean="0">
+                <a:rPr lang="en-US" sz="4000" dirty="0" smtClean="0">
                   <a:solidFill>
                     <a:srgbClr val="11C1FF"/>
                   </a:solidFill>
@@ -20275,13 +20495,13 @@
   <p:clrMapOvr>
     <a:masterClrMapping/>
   </p:clrMapOvr>
-  <mc:AlternateContent xmlns:mc="http://schemas.openxmlformats.org/markup-compatibility/2006">
-    <mc:Choice xmlns:p14="http://schemas.microsoft.com/office/powerpoint/2010/main" Requires="p14">
+  <mc:AlternateContent xmlns:mc="http://schemas.openxmlformats.org/markup-compatibility/2006" xmlns:p14="http://schemas.microsoft.com/office/powerpoint/2010/main">
+    <mc:Choice Requires="p14">
       <p:transition spd="med" p14:dur="700">
         <p:fade/>
       </p:transition>
     </mc:Choice>
-    <mc:Fallback>
+    <mc:Fallback xmlns="">
       <p:transition spd="med">
         <p:fade/>
       </p:transition>
@@ -20491,13 +20711,13 @@
   <p:clrMapOvr>
     <a:masterClrMapping/>
   </p:clrMapOvr>
-  <mc:AlternateContent xmlns:mc="http://schemas.openxmlformats.org/markup-compatibility/2006">
-    <mc:Choice xmlns:p14="http://schemas.microsoft.com/office/powerpoint/2010/main" Requires="p14">
+  <mc:AlternateContent xmlns:mc="http://schemas.openxmlformats.org/markup-compatibility/2006" xmlns:p14="http://schemas.microsoft.com/office/powerpoint/2010/main">
+    <mc:Choice Requires="p14">
       <p:transition spd="med" p14:dur="700">
         <p:fade/>
       </p:transition>
     </mc:Choice>
-    <mc:Fallback>
+    <mc:Fallback xmlns="">
       <p:transition spd="med">
         <p:fade/>
       </p:transition>
@@ -20586,7 +20806,11 @@
             </a:pPr>
             <a:r>
               <a:rPr lang="en-GB" dirty="0" smtClean="0"/>
-              <a:t>Introduction to the Azure Dashboard</a:t>
+              <a:t>Deploying </a:t>
+            </a:r>
+            <a:r>
+              <a:rPr lang="en-GB" dirty="0" smtClean="0"/>
+              <a:t>to Azure with Visual Studio</a:t>
             </a:r>
           </a:p>
           <a:p>
@@ -20596,7 +20820,7 @@
             </a:pPr>
             <a:r>
               <a:rPr lang="en-GB" dirty="0" smtClean="0"/>
-              <a:t>Deploying to Azure with Visual Studio</a:t>
+              <a:t>Deploying to Azure with GitHub</a:t>
             </a:r>
           </a:p>
           <a:p>
@@ -20605,19 +20829,18 @@
               <a:buAutoNum type="arabicParenR"/>
             </a:pPr>
             <a:r>
-              <a:rPr lang="en-GB" dirty="0" smtClean="0"/>
-              <a:t>Deploying to Azure with GitHub</a:t>
-            </a:r>
-          </a:p>
-          <a:p>
-            <a:pPr marL="742950" indent="-742950">
-              <a:buFont typeface="+mj-lt"/>
-              <a:buAutoNum type="arabicParenR"/>
-            </a:pPr>
-            <a:r>
-              <a:rPr lang="en-GB" dirty="0" smtClean="0"/>
-              <a:t>Debugging Remote Node Applications with Visual Studio</a:t>
-            </a:r>
+              <a:rPr lang="en-US" dirty="0"/>
+              <a:t>Remote </a:t>
+            </a:r>
+            <a:r>
+              <a:rPr lang="en-US" dirty="0" smtClean="0"/>
+              <a:t>debugging with </a:t>
+            </a:r>
+            <a:r>
+              <a:rPr lang="en-US" dirty="0"/>
+              <a:t>Visual Studio</a:t>
+            </a:r>
+            <a:endParaRPr lang="en-GB" dirty="0" smtClean="0"/>
           </a:p>
         </p:txBody>
       </p:sp>
@@ -20631,13 +20854,13 @@
   <p:clrMapOvr>
     <a:masterClrMapping/>
   </p:clrMapOvr>
-  <mc:AlternateContent xmlns:mc="http://schemas.openxmlformats.org/markup-compatibility/2006">
-    <mc:Choice xmlns:p14="http://schemas.microsoft.com/office/powerpoint/2010/main" Requires="p14">
+  <mc:AlternateContent xmlns:mc="http://schemas.openxmlformats.org/markup-compatibility/2006" xmlns:p14="http://schemas.microsoft.com/office/powerpoint/2010/main">
+    <mc:Choice Requires="p14">
       <p:transition spd="med" p14:dur="700">
         <p:fade/>
       </p:transition>
     </mc:Choice>
-    <mc:Fallback>
+    <mc:Fallback xmlns="">
       <p:transition spd="med">
         <p:fade/>
       </p:transition>
@@ -20707,13 +20930,13 @@
   <p:clrMapOvr>
     <a:masterClrMapping/>
   </p:clrMapOvr>
-  <mc:AlternateContent xmlns:mc="http://schemas.openxmlformats.org/markup-compatibility/2006">
-    <mc:Choice xmlns:p14="http://schemas.microsoft.com/office/powerpoint/2010/main" Requires="p14">
+  <mc:AlternateContent xmlns:mc="http://schemas.openxmlformats.org/markup-compatibility/2006" xmlns:p14="http://schemas.microsoft.com/office/powerpoint/2010/main">
+    <mc:Choice Requires="p14">
       <p:transition spd="med" p14:dur="700">
         <p:fade/>
       </p:transition>
     </mc:Choice>
-    <mc:Fallback>
+    <mc:Fallback xmlns="">
       <p:transition spd="med">
         <p:fade/>
       </p:transition>
@@ -20786,8 +21009,8 @@
         </p:blipFill>
         <p:spPr>
           <a:xfrm>
-            <a:off x="5276712" y="-373535"/>
-            <a:ext cx="7264070" cy="4706299"/>
+            <a:off x="5867367" y="0"/>
+            <a:ext cx="6324633" cy="4097650"/>
           </a:xfrm>
           <a:prstGeom prst="rect">
             <a:avLst/>
@@ -21584,13 +21807,13 @@
   <p:clrMapOvr>
     <a:masterClrMapping/>
   </p:clrMapOvr>
-  <mc:AlternateContent xmlns:mc="http://schemas.openxmlformats.org/markup-compatibility/2006">
-    <mc:Choice xmlns:p14="http://schemas.microsoft.com/office/powerpoint/2010/main" Requires="p14">
+  <mc:AlternateContent xmlns:mc="http://schemas.openxmlformats.org/markup-compatibility/2006" xmlns:p14="http://schemas.microsoft.com/office/powerpoint/2010/main">
+    <mc:Choice Requires="p14">
       <p:transition spd="med" p14:dur="700">
         <p:fade/>
       </p:transition>
     </mc:Choice>
-    <mc:Fallback>
+    <mc:Fallback xmlns="">
       <p:transition spd="med">
         <p:fade/>
       </p:transition>
@@ -22164,7 +22387,15 @@
           <a:p>
             <a:r>
               <a:rPr lang="en-US" dirty="0" smtClean="0"/>
-              <a:t>Easy to deploy a variety of different web sites : node, python, </a:t>
+              <a:t>Easy to deploy a variety of different web </a:t>
+            </a:r>
+            <a:r>
+              <a:rPr lang="en-US" dirty="0" smtClean="0"/>
+              <a:t>sites: </a:t>
+            </a:r>
+            <a:r>
+              <a:rPr lang="en-US" dirty="0" smtClean="0"/>
+              <a:t>node, python, </a:t>
             </a:r>
             <a:r>
               <a:rPr lang="en-US" dirty="0" err="1" smtClean="0"/>
@@ -22172,28 +22403,30 @@
             </a:r>
             <a:r>
               <a:rPr lang="en-US" dirty="0" smtClean="0"/>
-              <a:t>, asp.net, etc</a:t>
-            </a:r>
+              <a:t>, asp.net, etc.</a:t>
+            </a:r>
+          </a:p>
+          <a:p>
             <a:r>
               <a:rPr lang="en-US" dirty="0" smtClean="0"/>
-              <a:t>.</a:t>
+              <a:t>Can install some software from the gallery like WordPress or preconfigured stacks </a:t>
+            </a:r>
+            <a:r>
+              <a:rPr lang="en-US" dirty="0" smtClean="0"/>
+              <a:t>(MEAN stack)</a:t>
             </a:r>
             <a:endParaRPr lang="en-US" dirty="0" smtClean="0"/>
           </a:p>
           <a:p>
             <a:r>
               <a:rPr lang="en-US" dirty="0" smtClean="0"/>
-              <a:t>Can install some software from the gallery like WordPress or preconfigured stacks ( MEAN stack ) </a:t>
-            </a:r>
-          </a:p>
-          <a:p>
+              <a:t>Has a few limitations such as cannot configure ports, compile native modules for </a:t>
+            </a:r>
             <a:r>
               <a:rPr lang="en-US" dirty="0" smtClean="0"/>
-              <a:t>Has a few limitations such as cannot configure ports, compile native modules for Node </a:t>
-            </a:r>
-          </a:p>
-          <a:p>
-            <a:endParaRPr lang="en-US" dirty="0"/>
+              <a:t>Node</a:t>
+            </a:r>
+            <a:endParaRPr lang="en-US" dirty="0" smtClean="0"/>
           </a:p>
         </p:txBody>
       </p:sp>
@@ -22207,13 +22440,13 @@
   <p:clrMapOvr>
     <a:masterClrMapping/>
   </p:clrMapOvr>
-  <mc:AlternateContent xmlns:mc="http://schemas.openxmlformats.org/markup-compatibility/2006">
-    <mc:Choice xmlns:p14="http://schemas.microsoft.com/office/powerpoint/2010/main" Requires="p14">
+  <mc:AlternateContent xmlns:mc="http://schemas.openxmlformats.org/markup-compatibility/2006" xmlns:p14="http://schemas.microsoft.com/office/powerpoint/2010/main">
+    <mc:Choice Requires="p14">
       <p:transition spd="med" p14:dur="700">
         <p:fade/>
       </p:transition>
     </mc:Choice>
-    <mc:Fallback>
+    <mc:Fallback xmlns="">
       <p:transition spd="med">
         <p:fade/>
       </p:transition>
@@ -22304,8 +22537,13 @@
           <a:p>
             <a:r>
               <a:rPr lang="en-US" dirty="0" smtClean="0"/>
-              <a:t>Ideal for a production / staging environment </a:t>
-            </a:r>
+              <a:t>Ideal for a production / staging </a:t>
+            </a:r>
+            <a:r>
+              <a:rPr lang="en-US" dirty="0" smtClean="0"/>
+              <a:t>environment</a:t>
+            </a:r>
+            <a:endParaRPr lang="en-US" dirty="0" smtClean="0"/>
           </a:p>
           <a:p>
             <a:endParaRPr lang="en-US" dirty="0"/>
@@ -22322,13 +22560,13 @@
   <p:clrMapOvr>
     <a:masterClrMapping/>
   </p:clrMapOvr>
-  <mc:AlternateContent xmlns:mc="http://schemas.openxmlformats.org/markup-compatibility/2006">
-    <mc:Choice xmlns:p14="http://schemas.microsoft.com/office/powerpoint/2010/main" Requires="p14">
+  <mc:AlternateContent xmlns:mc="http://schemas.openxmlformats.org/markup-compatibility/2006" xmlns:p14="http://schemas.microsoft.com/office/powerpoint/2010/main">
+    <mc:Choice Requires="p14">
       <p:transition spd="med" p14:dur="700">
         <p:fade/>
       </p:transition>
     </mc:Choice>
-    <mc:Fallback>
+    <mc:Fallback xmlns="">
       <p:transition spd="med">
         <p:fade/>
       </p:transition>
@@ -22410,13 +22648,13 @@
   <p:clrMapOvr>
     <a:masterClrMapping/>
   </p:clrMapOvr>
-  <mc:AlternateContent xmlns:mc="http://schemas.openxmlformats.org/markup-compatibility/2006">
-    <mc:Choice xmlns:p14="http://schemas.microsoft.com/office/powerpoint/2010/main" Requires="p14">
+  <mc:AlternateContent xmlns:mc="http://schemas.openxmlformats.org/markup-compatibility/2006" xmlns:p14="http://schemas.microsoft.com/office/powerpoint/2010/main">
+    <mc:Choice Requires="p14">
       <p:transition spd="med" p14:dur="700">
         <p:fade/>
       </p:transition>
     </mc:Choice>
-    <mc:Fallback>
+    <mc:Fallback xmlns="">
       <p:transition spd="med">
         <p:fade/>
       </p:transition>
@@ -22786,13 +23024,13 @@
   <p:clrMapOvr>
     <a:masterClrMapping/>
   </p:clrMapOvr>
-  <mc:AlternateContent xmlns:mc="http://schemas.openxmlformats.org/markup-compatibility/2006">
-    <mc:Choice xmlns:p14="http://schemas.microsoft.com/office/powerpoint/2010/main" Requires="p14">
+  <mc:AlternateContent xmlns:mc="http://schemas.openxmlformats.org/markup-compatibility/2006" xmlns:p14="http://schemas.microsoft.com/office/powerpoint/2010/main">
+    <mc:Choice Requires="p14">
       <p:transition spd="med" p14:dur="700">
         <p:fade/>
       </p:transition>
     </mc:Choice>
-    <mc:Fallback>
+    <mc:Fallback xmlns="">
       <p:transition spd="med">
         <p:fade/>
       </p:transition>
@@ -22857,13 +23095,13 @@
   <p:clrMapOvr>
     <a:masterClrMapping/>
   </p:clrMapOvr>
-  <mc:AlternateContent xmlns:mc="http://schemas.openxmlformats.org/markup-compatibility/2006">
-    <mc:Choice xmlns:p14="http://schemas.microsoft.com/office/powerpoint/2010/main" Requires="p14">
+  <mc:AlternateContent xmlns:mc="http://schemas.openxmlformats.org/markup-compatibility/2006" xmlns:p14="http://schemas.microsoft.com/office/powerpoint/2010/main">
+    <mc:Choice Requires="p14">
       <p:transition spd="med" p14:dur="700">
         <p:fade/>
       </p:transition>
     </mc:Choice>
-    <mc:Fallback>
+    <mc:Fallback xmlns="">
       <p:transition spd="med">
         <p:fade/>
       </p:transition>
@@ -24902,21 +25140,6 @@
 </file>
 
 <file path=customXml/item1.xml><?xml version="1.0" encoding="utf-8"?>
-<?mso-contentType ?>
-<FormTemplates xmlns="http://schemas.microsoft.com/sharepoint/v3/contenttype/forms">
-  <Display>DocumentLibraryForm</Display>
-  <Edit>DocumentLibraryForm</Edit>
-  <New>DocumentLibraryForm</New>
-</FormTemplates>
-</file>
-
-<file path=customXml/item2.xml><?xml version="1.0" encoding="utf-8"?>
-<p:properties xmlns:p="http://schemas.microsoft.com/office/2006/metadata/properties" xmlns:xsi="http://www.w3.org/2001/XMLSchema-instance" xmlns:pc="http://schemas.microsoft.com/office/infopath/2007/PartnerControls">
-  <documentManagement/>
-</p:properties>
-</file>
-
-<file path=customXml/item3.xml><?xml version="1.0" encoding="utf-8"?>
 <ct:contentTypeSchema xmlns:ct="http://schemas.microsoft.com/office/2006/metadata/contentType" xmlns:ma="http://schemas.microsoft.com/office/2006/metadata/properties/metaAttributes" ct:_="" ma:_="" ma:contentTypeName="Document" ma:contentTypeID="0x010100391E57C78B9F604FB8BAD296D1460E2A" ma:contentTypeVersion="1" ma:contentTypeDescription="Create a new document." ma:contentTypeScope="" ma:versionID="fb382fe2362acd2155f454904f478e4d">
   <xsd:schema xmlns:xsd="http://www.w3.org/2001/XMLSchema" xmlns:xs="http://www.w3.org/2001/XMLSchema" xmlns:p="http://schemas.microsoft.com/office/2006/metadata/properties" xmlns:ns3="636b0322-90fb-440c-9cbc-22749e7231e9" targetNamespace="http://schemas.microsoft.com/office/2006/metadata/properties" ma:root="true" ma:fieldsID="b9887c63ce4710c1aeb75a5f03aecb69" ns3:_="">
     <xsd:import namespace="636b0322-90fb-440c-9cbc-22749e7231e9"/>
@@ -25056,10 +25279,35 @@
 </ct:contentTypeSchema>
 </file>
 
+<file path=customXml/item2.xml><?xml version="1.0" encoding="utf-8"?>
+<p:properties xmlns:p="http://schemas.microsoft.com/office/2006/metadata/properties" xmlns:xsi="http://www.w3.org/2001/XMLSchema-instance" xmlns:pc="http://schemas.microsoft.com/office/infopath/2007/PartnerControls">
+  <documentManagement/>
+</p:properties>
+</file>
+
+<file path=customXml/item3.xml><?xml version="1.0" encoding="utf-8"?>
+<?mso-contentType ?>
+<FormTemplates xmlns="http://schemas.microsoft.com/sharepoint/v3/contenttype/forms">
+  <Display>DocumentLibraryForm</Display>
+  <Edit>DocumentLibraryForm</Edit>
+  <New>DocumentLibraryForm</New>
+</FormTemplates>
+</file>
+
 <file path=customXml/itemProps1.xml><?xml version="1.0" encoding="utf-8"?>
-<ds:datastoreItem xmlns:ds="http://schemas.openxmlformats.org/officeDocument/2006/customXml" ds:itemID="{B0CA13EC-1D3C-4D6F-8D1C-E8A452CFC79A}">
+<ds:datastoreItem xmlns:ds="http://schemas.openxmlformats.org/officeDocument/2006/customXml" ds:itemID="{7B70CE0C-0988-423A-BF66-B40F6A1061FF}">
   <ds:schemaRefs>
-    <ds:schemaRef ds:uri="http://schemas.microsoft.com/sharepoint/v3/contenttype/forms"/>
+    <ds:schemaRef ds:uri="http://schemas.microsoft.com/office/2006/metadata/contentType"/>
+    <ds:schemaRef ds:uri="http://schemas.microsoft.com/office/2006/metadata/properties/metaAttributes"/>
+    <ds:schemaRef ds:uri="http://www.w3.org/2001/XMLSchema"/>
+    <ds:schemaRef ds:uri="http://schemas.microsoft.com/office/2006/metadata/properties"/>
+    <ds:schemaRef ds:uri="636b0322-90fb-440c-9cbc-22749e7231e9"/>
+    <ds:schemaRef ds:uri="http://schemas.microsoft.com/office/2006/documentManagement/types"/>
+    <ds:schemaRef ds:uri="http://schemas.microsoft.com/office/infopath/2007/PartnerControls"/>
+    <ds:schemaRef ds:uri="http://schemas.openxmlformats.org/package/2006/metadata/core-properties"/>
+    <ds:schemaRef ds:uri="http://purl.org/dc/elements/1.1/"/>
+    <ds:schemaRef ds:uri="http://purl.org/dc/terms/"/>
+    <ds:schemaRef ds:uri="http://schemas.microsoft.com/internal/obd"/>
   </ds:schemaRefs>
 </ds:datastoreItem>
 </file>
@@ -25081,19 +25329,9 @@
 </file>
 
 <file path=customXml/itemProps3.xml><?xml version="1.0" encoding="utf-8"?>
-<ds:datastoreItem xmlns:ds="http://schemas.openxmlformats.org/officeDocument/2006/customXml" ds:itemID="{7B70CE0C-0988-423A-BF66-B40F6A1061FF}">
+<ds:datastoreItem xmlns:ds="http://schemas.openxmlformats.org/officeDocument/2006/customXml" ds:itemID="{B0CA13EC-1D3C-4D6F-8D1C-E8A452CFC79A}">
   <ds:schemaRefs>
-    <ds:schemaRef ds:uri="http://schemas.microsoft.com/office/2006/metadata/contentType"/>
-    <ds:schemaRef ds:uri="http://schemas.microsoft.com/office/2006/metadata/properties/metaAttributes"/>
-    <ds:schemaRef ds:uri="http://www.w3.org/2001/XMLSchema"/>
-    <ds:schemaRef ds:uri="http://schemas.microsoft.com/office/2006/metadata/properties"/>
-    <ds:schemaRef ds:uri="636b0322-90fb-440c-9cbc-22749e7231e9"/>
-    <ds:schemaRef ds:uri="http://schemas.microsoft.com/office/2006/documentManagement/types"/>
-    <ds:schemaRef ds:uri="http://schemas.microsoft.com/office/infopath/2007/PartnerControls"/>
-    <ds:schemaRef ds:uri="http://schemas.openxmlformats.org/package/2006/metadata/core-properties"/>
-    <ds:schemaRef ds:uri="http://purl.org/dc/elements/1.1/"/>
-    <ds:schemaRef ds:uri="http://purl.org/dc/terms/"/>
-    <ds:schemaRef ds:uri="http://schemas.microsoft.com/internal/obd"/>
+    <ds:schemaRef ds:uri="http://schemas.microsoft.com/sharepoint/v3/contenttype/forms"/>
   </ds:schemaRefs>
 </ds:datastoreItem>
 </file>
</xml_diff>

<commit_message>
Added Provisioning step to AzureDeployAndDebug presentation
</commit_message>
<xml_diff>
--- a/Presentation/AzureDeployAndDebug/AzureDeployAndDebug.pptx
+++ b/Presentation/AzureDeployAndDebug/AzureDeployAndDebug.pptx
@@ -11,10 +11,10 @@
     <p:sldMasterId id="2147483726" r:id="rId10"/>
   </p:sldMasterIdLst>
   <p:notesMasterIdLst>
-    <p:notesMasterId r:id="rId29"/>
+    <p:notesMasterId r:id="rId34"/>
   </p:notesMasterIdLst>
   <p:handoutMasterIdLst>
-    <p:handoutMasterId r:id="rId30"/>
+    <p:handoutMasterId r:id="rId35"/>
   </p:handoutMasterIdLst>
   <p:sldIdLst>
     <p:sldId id="285" r:id="rId11"/>
@@ -24,17 +24,22 @@
     <p:sldId id="283" r:id="rId15"/>
     <p:sldId id="284" r:id="rId16"/>
     <p:sldId id="288" r:id="rId17"/>
-    <p:sldId id="298" r:id="rId18"/>
-    <p:sldId id="280" r:id="rId19"/>
-    <p:sldId id="289" r:id="rId20"/>
-    <p:sldId id="296" r:id="rId21"/>
-    <p:sldId id="295" r:id="rId22"/>
-    <p:sldId id="297" r:id="rId23"/>
-    <p:sldId id="290" r:id="rId24"/>
-    <p:sldId id="291" r:id="rId25"/>
-    <p:sldId id="292" r:id="rId26"/>
-    <p:sldId id="293" r:id="rId27"/>
-    <p:sldId id="263" r:id="rId28"/>
+    <p:sldId id="300" r:id="rId18"/>
+    <p:sldId id="301" r:id="rId19"/>
+    <p:sldId id="302" r:id="rId20"/>
+    <p:sldId id="303" r:id="rId21"/>
+    <p:sldId id="299" r:id="rId22"/>
+    <p:sldId id="298" r:id="rId23"/>
+    <p:sldId id="280" r:id="rId24"/>
+    <p:sldId id="289" r:id="rId25"/>
+    <p:sldId id="296" r:id="rId26"/>
+    <p:sldId id="295" r:id="rId27"/>
+    <p:sldId id="297" r:id="rId28"/>
+    <p:sldId id="290" r:id="rId29"/>
+    <p:sldId id="291" r:id="rId30"/>
+    <p:sldId id="292" r:id="rId31"/>
+    <p:sldId id="293" r:id="rId32"/>
+    <p:sldId id="263" r:id="rId33"/>
   </p:sldIdLst>
   <p:sldSz cx="12192000" cy="6858000"/>
   <p:notesSz cx="6858000" cy="9144000"/>
@@ -226,7 +231,7 @@
           <a:p>
             <a:fld id="{312E7B4A-039C-48A2-9B2C-AF16AA3873D8}" type="datetimeFigureOut">
               <a:rPr lang="en-US" smtClean="0"/>
-              <a:t>1/27/2016</a:t>
+              <a:t>2/4/2016</a:t>
             </a:fld>
             <a:endParaRPr lang="en-US"/>
           </a:p>
@@ -391,7 +396,7 @@
           <a:p>
             <a:fld id="{DA005A0C-54D9-45AA-87D4-C551D08DFCE1}" type="datetimeFigureOut">
               <a:rPr lang="en-US" smtClean="0"/>
-              <a:t>1/27/2016</a:t>
+              <a:t>2/4/2016</a:t>
             </a:fld>
             <a:endParaRPr lang="en-US"/>
           </a:p>
@@ -816,7 +821,7 @@
           <a:p>
             <a:fld id="{2C52CFDC-D2D5-4B9F-BA75-89F771E01AEB}" type="slidenum">
               <a:rPr lang="en-US" smtClean="0"/>
-              <a:t>11</a:t>
+              <a:t>16</a:t>
             </a:fld>
             <a:endParaRPr lang="en-US"/>
           </a:p>
@@ -1132,7 +1137,7 @@
                 </a:solidFill>
               </a:rPr>
               <a:pPr/>
-              <a:t>12</a:t>
+              <a:t>17</a:t>
             </a:fld>
             <a:endParaRPr lang="en-US">
               <a:solidFill>
@@ -1332,7 +1337,7 @@
                 </a:solidFill>
               </a:rPr>
               <a:pPr/>
-              <a:t>1/27/2016</a:t>
+              <a:t>2/4/2016</a:t>
             </a:fld>
             <a:endParaRPr lang="en-US" dirty="0">
               <a:solidFill>
@@ -1364,7 +1369,7 @@
                 </a:solidFill>
               </a:rPr>
               <a:pPr/>
-              <a:t>17</a:t>
+              <a:t>22</a:t>
             </a:fld>
             <a:endParaRPr lang="en-US" dirty="0">
               <a:solidFill>
@@ -1561,28 +1566,28 @@
                 <a:gridCol w="2764105">
                   <a:extLst>
                     <a:ext uri="{9D8B030D-6E8A-4147-A177-3AD203B41FA5}">
-                      <a16:colId xmlns:a16="http://schemas.microsoft.com/office/drawing/2014/main" val="20000"/>
+                      <a16:colId xmlns:a16="http://schemas.microsoft.com/office/drawing/2014/main" xmlns="" val="20000"/>
                     </a:ext>
                   </a:extLst>
                 </a:gridCol>
                 <a:gridCol w="2764105">
                   <a:extLst>
                     <a:ext uri="{9D8B030D-6E8A-4147-A177-3AD203B41FA5}">
-                      <a16:colId xmlns:a16="http://schemas.microsoft.com/office/drawing/2014/main" val="20001"/>
+                      <a16:colId xmlns:a16="http://schemas.microsoft.com/office/drawing/2014/main" xmlns="" val="20001"/>
                     </a:ext>
                   </a:extLst>
                 </a:gridCol>
                 <a:gridCol w="2764105">
                   <a:extLst>
                     <a:ext uri="{9D8B030D-6E8A-4147-A177-3AD203B41FA5}">
-                      <a16:colId xmlns:a16="http://schemas.microsoft.com/office/drawing/2014/main" val="20002"/>
+                      <a16:colId xmlns:a16="http://schemas.microsoft.com/office/drawing/2014/main" xmlns="" val="20002"/>
                     </a:ext>
                   </a:extLst>
                 </a:gridCol>
                 <a:gridCol w="2764105">
                   <a:extLst>
                     <a:ext uri="{9D8B030D-6E8A-4147-A177-3AD203B41FA5}">
-                      <a16:colId xmlns:a16="http://schemas.microsoft.com/office/drawing/2014/main" val="20003"/>
+                      <a16:colId xmlns:a16="http://schemas.microsoft.com/office/drawing/2014/main" xmlns="" val="20003"/>
                     </a:ext>
                   </a:extLst>
                 </a:gridCol>
@@ -1762,7 +1767,7 @@
                 </a:tc>
                 <a:extLst>
                   <a:ext uri="{0D108BD9-81ED-4DB2-BD59-A6C34878D82A}">
-                    <a16:rowId xmlns:a16="http://schemas.microsoft.com/office/drawing/2014/main" val="10000"/>
+                    <a16:rowId xmlns:a16="http://schemas.microsoft.com/office/drawing/2014/main" xmlns="" val="10000"/>
                   </a:ext>
                 </a:extLst>
               </a:tr>
@@ -1998,7 +2003,7 @@
                 </a:tc>
                 <a:extLst>
                   <a:ext uri="{0D108BD9-81ED-4DB2-BD59-A6C34878D82A}">
-                    <a16:rowId xmlns:a16="http://schemas.microsoft.com/office/drawing/2014/main" val="10001"/>
+                    <a16:rowId xmlns:a16="http://schemas.microsoft.com/office/drawing/2014/main" xmlns="" val="10001"/>
                   </a:ext>
                 </a:extLst>
               </a:tr>
@@ -2253,7 +2258,7 @@
                 </a:tc>
                 <a:extLst>
                   <a:ext uri="{0D108BD9-81ED-4DB2-BD59-A6C34878D82A}">
-                    <a16:rowId xmlns:a16="http://schemas.microsoft.com/office/drawing/2014/main" val="10002"/>
+                    <a16:rowId xmlns:a16="http://schemas.microsoft.com/office/drawing/2014/main" xmlns="" val="10002"/>
                   </a:ext>
                 </a:extLst>
               </a:tr>
@@ -2508,7 +2513,7 @@
                 </a:tc>
                 <a:extLst>
                   <a:ext uri="{0D108BD9-81ED-4DB2-BD59-A6C34878D82A}">
-                    <a16:rowId xmlns:a16="http://schemas.microsoft.com/office/drawing/2014/main" val="10003"/>
+                    <a16:rowId xmlns:a16="http://schemas.microsoft.com/office/drawing/2014/main" xmlns="" val="10003"/>
                   </a:ext>
                 </a:extLst>
               </a:tr>
@@ -4507,28 +4512,28 @@
                 <a:gridCol w="2764105">
                   <a:extLst>
                     <a:ext uri="{9D8B030D-6E8A-4147-A177-3AD203B41FA5}">
-                      <a16:colId xmlns:a16="http://schemas.microsoft.com/office/drawing/2014/main" val="20000"/>
+                      <a16:colId xmlns:a16="http://schemas.microsoft.com/office/drawing/2014/main" xmlns="" val="20000"/>
                     </a:ext>
                   </a:extLst>
                 </a:gridCol>
                 <a:gridCol w="2764105">
                   <a:extLst>
                     <a:ext uri="{9D8B030D-6E8A-4147-A177-3AD203B41FA5}">
-                      <a16:colId xmlns:a16="http://schemas.microsoft.com/office/drawing/2014/main" val="20001"/>
+                      <a16:colId xmlns:a16="http://schemas.microsoft.com/office/drawing/2014/main" xmlns="" val="20001"/>
                     </a:ext>
                   </a:extLst>
                 </a:gridCol>
                 <a:gridCol w="2764105">
                   <a:extLst>
                     <a:ext uri="{9D8B030D-6E8A-4147-A177-3AD203B41FA5}">
-                      <a16:colId xmlns:a16="http://schemas.microsoft.com/office/drawing/2014/main" val="20002"/>
+                      <a16:colId xmlns:a16="http://schemas.microsoft.com/office/drawing/2014/main" xmlns="" val="20002"/>
                     </a:ext>
                   </a:extLst>
                 </a:gridCol>
                 <a:gridCol w="2764105">
                   <a:extLst>
                     <a:ext uri="{9D8B030D-6E8A-4147-A177-3AD203B41FA5}">
-                      <a16:colId xmlns:a16="http://schemas.microsoft.com/office/drawing/2014/main" val="20003"/>
+                      <a16:colId xmlns:a16="http://schemas.microsoft.com/office/drawing/2014/main" xmlns="" val="20003"/>
                     </a:ext>
                   </a:extLst>
                 </a:gridCol>
@@ -4692,7 +4697,7 @@
                 </a:tc>
                 <a:extLst>
                   <a:ext uri="{0D108BD9-81ED-4DB2-BD59-A6C34878D82A}">
-                    <a16:rowId xmlns:a16="http://schemas.microsoft.com/office/drawing/2014/main" val="10000"/>
+                    <a16:rowId xmlns:a16="http://schemas.microsoft.com/office/drawing/2014/main" xmlns="" val="10000"/>
                   </a:ext>
                 </a:extLst>
               </a:tr>
@@ -4912,7 +4917,7 @@
                 </a:tc>
                 <a:extLst>
                   <a:ext uri="{0D108BD9-81ED-4DB2-BD59-A6C34878D82A}">
-                    <a16:rowId xmlns:a16="http://schemas.microsoft.com/office/drawing/2014/main" val="10001"/>
+                    <a16:rowId xmlns:a16="http://schemas.microsoft.com/office/drawing/2014/main" xmlns="" val="10001"/>
                   </a:ext>
                 </a:extLst>
               </a:tr>
@@ -5151,7 +5156,7 @@
                 </a:tc>
                 <a:extLst>
                   <a:ext uri="{0D108BD9-81ED-4DB2-BD59-A6C34878D82A}">
-                    <a16:rowId xmlns:a16="http://schemas.microsoft.com/office/drawing/2014/main" val="10002"/>
+                    <a16:rowId xmlns:a16="http://schemas.microsoft.com/office/drawing/2014/main" xmlns="" val="10002"/>
                   </a:ext>
                 </a:extLst>
               </a:tr>
@@ -5390,7 +5395,7 @@
                 </a:tc>
                 <a:extLst>
                   <a:ext uri="{0D108BD9-81ED-4DB2-BD59-A6C34878D82A}">
-                    <a16:rowId xmlns:a16="http://schemas.microsoft.com/office/drawing/2014/main" val="10003"/>
+                    <a16:rowId xmlns:a16="http://schemas.microsoft.com/office/drawing/2014/main" xmlns="" val="10003"/>
                   </a:ext>
                 </a:extLst>
               </a:tr>
@@ -6268,28 +6273,28 @@
                 <a:gridCol w="2764105">
                   <a:extLst>
                     <a:ext uri="{9D8B030D-6E8A-4147-A177-3AD203B41FA5}">
-                      <a16:colId xmlns:a16="http://schemas.microsoft.com/office/drawing/2014/main" val="20000"/>
+                      <a16:colId xmlns:a16="http://schemas.microsoft.com/office/drawing/2014/main" xmlns="" val="20000"/>
                     </a:ext>
                   </a:extLst>
                 </a:gridCol>
                 <a:gridCol w="2764105">
                   <a:extLst>
                     <a:ext uri="{9D8B030D-6E8A-4147-A177-3AD203B41FA5}">
-                      <a16:colId xmlns:a16="http://schemas.microsoft.com/office/drawing/2014/main" val="20001"/>
+                      <a16:colId xmlns:a16="http://schemas.microsoft.com/office/drawing/2014/main" xmlns="" val="20001"/>
                     </a:ext>
                   </a:extLst>
                 </a:gridCol>
                 <a:gridCol w="2764105">
                   <a:extLst>
                     <a:ext uri="{9D8B030D-6E8A-4147-A177-3AD203B41FA5}">
-                      <a16:colId xmlns:a16="http://schemas.microsoft.com/office/drawing/2014/main" val="20002"/>
+                      <a16:colId xmlns:a16="http://schemas.microsoft.com/office/drawing/2014/main" xmlns="" val="20002"/>
                     </a:ext>
                   </a:extLst>
                 </a:gridCol>
                 <a:gridCol w="2764105">
                   <a:extLst>
                     <a:ext uri="{9D8B030D-6E8A-4147-A177-3AD203B41FA5}">
-                      <a16:colId xmlns:a16="http://schemas.microsoft.com/office/drawing/2014/main" val="20003"/>
+                      <a16:colId xmlns:a16="http://schemas.microsoft.com/office/drawing/2014/main" xmlns="" val="20003"/>
                     </a:ext>
                   </a:extLst>
                 </a:gridCol>
@@ -6465,7 +6470,7 @@
                 </a:tc>
                 <a:extLst>
                   <a:ext uri="{0D108BD9-81ED-4DB2-BD59-A6C34878D82A}">
-                    <a16:rowId xmlns:a16="http://schemas.microsoft.com/office/drawing/2014/main" val="10000"/>
+                    <a16:rowId xmlns:a16="http://schemas.microsoft.com/office/drawing/2014/main" xmlns="" val="10000"/>
                   </a:ext>
                 </a:extLst>
               </a:tr>
@@ -6697,7 +6702,7 @@
                 </a:tc>
                 <a:extLst>
                   <a:ext uri="{0D108BD9-81ED-4DB2-BD59-A6C34878D82A}">
-                    <a16:rowId xmlns:a16="http://schemas.microsoft.com/office/drawing/2014/main" val="10001"/>
+                    <a16:rowId xmlns:a16="http://schemas.microsoft.com/office/drawing/2014/main" xmlns="" val="10001"/>
                   </a:ext>
                 </a:extLst>
               </a:tr>
@@ -6956,7 +6961,7 @@
                 </a:tc>
                 <a:extLst>
                   <a:ext uri="{0D108BD9-81ED-4DB2-BD59-A6C34878D82A}">
-                    <a16:rowId xmlns:a16="http://schemas.microsoft.com/office/drawing/2014/main" val="10002"/>
+                    <a16:rowId xmlns:a16="http://schemas.microsoft.com/office/drawing/2014/main" xmlns="" val="10002"/>
                   </a:ext>
                 </a:extLst>
               </a:tr>
@@ -7207,7 +7212,7 @@
                 </a:tc>
                 <a:extLst>
                   <a:ext uri="{0D108BD9-81ED-4DB2-BD59-A6C34878D82A}">
-                    <a16:rowId xmlns:a16="http://schemas.microsoft.com/office/drawing/2014/main" val="10003"/>
+                    <a16:rowId xmlns:a16="http://schemas.microsoft.com/office/drawing/2014/main" xmlns="" val="10003"/>
                   </a:ext>
                 </a:extLst>
               </a:tr>
@@ -8271,28 +8276,28 @@
                 <a:gridCol w="2764105">
                   <a:extLst>
                     <a:ext uri="{9D8B030D-6E8A-4147-A177-3AD203B41FA5}">
-                      <a16:colId xmlns:a16="http://schemas.microsoft.com/office/drawing/2014/main" val="20000"/>
+                      <a16:colId xmlns:a16="http://schemas.microsoft.com/office/drawing/2014/main" xmlns="" val="20000"/>
                     </a:ext>
                   </a:extLst>
                 </a:gridCol>
                 <a:gridCol w="2764105">
                   <a:extLst>
                     <a:ext uri="{9D8B030D-6E8A-4147-A177-3AD203B41FA5}">
-                      <a16:colId xmlns:a16="http://schemas.microsoft.com/office/drawing/2014/main" val="20001"/>
+                      <a16:colId xmlns:a16="http://schemas.microsoft.com/office/drawing/2014/main" xmlns="" val="20001"/>
                     </a:ext>
                   </a:extLst>
                 </a:gridCol>
                 <a:gridCol w="2764105">
                   <a:extLst>
                     <a:ext uri="{9D8B030D-6E8A-4147-A177-3AD203B41FA5}">
-                      <a16:colId xmlns:a16="http://schemas.microsoft.com/office/drawing/2014/main" val="20002"/>
+                      <a16:colId xmlns:a16="http://schemas.microsoft.com/office/drawing/2014/main" xmlns="" val="20002"/>
                     </a:ext>
                   </a:extLst>
                 </a:gridCol>
                 <a:gridCol w="2764105">
                   <a:extLst>
                     <a:ext uri="{9D8B030D-6E8A-4147-A177-3AD203B41FA5}">
-                      <a16:colId xmlns:a16="http://schemas.microsoft.com/office/drawing/2014/main" val="20003"/>
+                      <a16:colId xmlns:a16="http://schemas.microsoft.com/office/drawing/2014/main" xmlns="" val="20003"/>
                     </a:ext>
                   </a:extLst>
                 </a:gridCol>
@@ -8472,7 +8477,7 @@
                 </a:tc>
                 <a:extLst>
                   <a:ext uri="{0D108BD9-81ED-4DB2-BD59-A6C34878D82A}">
-                    <a16:rowId xmlns:a16="http://schemas.microsoft.com/office/drawing/2014/main" val="10000"/>
+                    <a16:rowId xmlns:a16="http://schemas.microsoft.com/office/drawing/2014/main" xmlns="" val="10000"/>
                   </a:ext>
                 </a:extLst>
               </a:tr>
@@ -8708,7 +8713,7 @@
                 </a:tc>
                 <a:extLst>
                   <a:ext uri="{0D108BD9-81ED-4DB2-BD59-A6C34878D82A}">
-                    <a16:rowId xmlns:a16="http://schemas.microsoft.com/office/drawing/2014/main" val="10001"/>
+                    <a16:rowId xmlns:a16="http://schemas.microsoft.com/office/drawing/2014/main" xmlns="" val="10001"/>
                   </a:ext>
                 </a:extLst>
               </a:tr>
@@ -8963,7 +8968,7 @@
                 </a:tc>
                 <a:extLst>
                   <a:ext uri="{0D108BD9-81ED-4DB2-BD59-A6C34878D82A}">
-                    <a16:rowId xmlns:a16="http://schemas.microsoft.com/office/drawing/2014/main" val="10002"/>
+                    <a16:rowId xmlns:a16="http://schemas.microsoft.com/office/drawing/2014/main" xmlns="" val="10002"/>
                   </a:ext>
                 </a:extLst>
               </a:tr>
@@ -9218,7 +9223,7 @@
                 </a:tc>
                 <a:extLst>
                   <a:ext uri="{0D108BD9-81ED-4DB2-BD59-A6C34878D82A}">
-                    <a16:rowId xmlns:a16="http://schemas.microsoft.com/office/drawing/2014/main" val="10003"/>
+                    <a16:rowId xmlns:a16="http://schemas.microsoft.com/office/drawing/2014/main" xmlns="" val="10003"/>
                   </a:ext>
                 </a:extLst>
               </a:tr>
@@ -10205,28 +10210,28 @@
                 <a:gridCol w="2764105">
                   <a:extLst>
                     <a:ext uri="{9D8B030D-6E8A-4147-A177-3AD203B41FA5}">
-                      <a16:colId xmlns:a16="http://schemas.microsoft.com/office/drawing/2014/main" val="20000"/>
+                      <a16:colId xmlns:a16="http://schemas.microsoft.com/office/drawing/2014/main" xmlns="" val="20000"/>
                     </a:ext>
                   </a:extLst>
                 </a:gridCol>
                 <a:gridCol w="2764105">
                   <a:extLst>
                     <a:ext uri="{9D8B030D-6E8A-4147-A177-3AD203B41FA5}">
-                      <a16:colId xmlns:a16="http://schemas.microsoft.com/office/drawing/2014/main" val="20001"/>
+                      <a16:colId xmlns:a16="http://schemas.microsoft.com/office/drawing/2014/main" xmlns="" val="20001"/>
                     </a:ext>
                   </a:extLst>
                 </a:gridCol>
                 <a:gridCol w="2764105">
                   <a:extLst>
                     <a:ext uri="{9D8B030D-6E8A-4147-A177-3AD203B41FA5}">
-                      <a16:colId xmlns:a16="http://schemas.microsoft.com/office/drawing/2014/main" val="20002"/>
+                      <a16:colId xmlns:a16="http://schemas.microsoft.com/office/drawing/2014/main" xmlns="" val="20002"/>
                     </a:ext>
                   </a:extLst>
                 </a:gridCol>
                 <a:gridCol w="2764105">
                   <a:extLst>
                     <a:ext uri="{9D8B030D-6E8A-4147-A177-3AD203B41FA5}">
-                      <a16:colId xmlns:a16="http://schemas.microsoft.com/office/drawing/2014/main" val="20003"/>
+                      <a16:colId xmlns:a16="http://schemas.microsoft.com/office/drawing/2014/main" xmlns="" val="20003"/>
                     </a:ext>
                   </a:extLst>
                 </a:gridCol>
@@ -10406,7 +10411,7 @@
                 </a:tc>
                 <a:extLst>
                   <a:ext uri="{0D108BD9-81ED-4DB2-BD59-A6C34878D82A}">
-                    <a16:rowId xmlns:a16="http://schemas.microsoft.com/office/drawing/2014/main" val="10000"/>
+                    <a16:rowId xmlns:a16="http://schemas.microsoft.com/office/drawing/2014/main" xmlns="" val="10000"/>
                   </a:ext>
                 </a:extLst>
               </a:tr>
@@ -10642,7 +10647,7 @@
                 </a:tc>
                 <a:extLst>
                   <a:ext uri="{0D108BD9-81ED-4DB2-BD59-A6C34878D82A}">
-                    <a16:rowId xmlns:a16="http://schemas.microsoft.com/office/drawing/2014/main" val="10001"/>
+                    <a16:rowId xmlns:a16="http://schemas.microsoft.com/office/drawing/2014/main" xmlns="" val="10001"/>
                   </a:ext>
                 </a:extLst>
               </a:tr>
@@ -10897,7 +10902,7 @@
                 </a:tc>
                 <a:extLst>
                   <a:ext uri="{0D108BD9-81ED-4DB2-BD59-A6C34878D82A}">
-                    <a16:rowId xmlns:a16="http://schemas.microsoft.com/office/drawing/2014/main" val="10002"/>
+                    <a16:rowId xmlns:a16="http://schemas.microsoft.com/office/drawing/2014/main" xmlns="" val="10002"/>
                   </a:ext>
                 </a:extLst>
               </a:tr>
@@ -11152,7 +11157,7 @@
                 </a:tc>
                 <a:extLst>
                   <a:ext uri="{0D108BD9-81ED-4DB2-BD59-A6C34878D82A}">
-                    <a16:rowId xmlns:a16="http://schemas.microsoft.com/office/drawing/2014/main" val="10003"/>
+                    <a16:rowId xmlns:a16="http://schemas.microsoft.com/office/drawing/2014/main" xmlns="" val="10003"/>
                   </a:ext>
                 </a:extLst>
               </a:tr>
@@ -17993,22 +17998,26 @@
           <a:lstStyle/>
           <a:p>
             <a:r>
+              <a:rPr lang="en-US" sz="7200" dirty="0" smtClean="0"/>
+              <a:t>Provisioning</a:t>
+            </a:r>
+            <a:r>
               <a:rPr lang="en-US" sz="7200" dirty="0"/>
-              <a:t>Debugging </a:t>
+              <a:t>, Deploying </a:t>
             </a:r>
             <a:r>
               <a:rPr lang="en-US" sz="7200" dirty="0" smtClean="0"/>
-              <a:t>and</a:t>
+              <a:t>and Debugging</a:t>
+            </a:r>
+            <a:r>
+              <a:rPr lang="en-US" sz="7200" dirty="0" smtClean="0"/>
+              <a:t/>
             </a:r>
             <a:br>
               <a:rPr lang="en-US" sz="7200" dirty="0" smtClean="0"/>
             </a:br>
             <a:r>
               <a:rPr lang="en-US" sz="7200" dirty="0" smtClean="0"/>
-              <a:t>Deploying </a:t>
-            </a:r>
-            <a:r>
-              <a:rPr lang="en-US" sz="7200" dirty="0"/>
               <a:t>on </a:t>
             </a:r>
             <a:r>
@@ -18152,6 +18161,380 @@
       </p:grpSpPr>
       <p:sp>
         <p:nvSpPr>
+          <p:cNvPr id="2" name="Title 1"/>
+          <p:cNvSpPr>
+            <a:spLocks noGrp="1"/>
+          </p:cNvSpPr>
+          <p:nvPr>
+            <p:ph type="title"/>
+          </p:nvPr>
+        </p:nvSpPr>
+        <p:spPr/>
+        <p:txBody>
+          <a:bodyPr/>
+          <a:lstStyle/>
+          <a:p>
+            <a:r>
+              <a:rPr lang="en-US" dirty="0"/>
+              <a:t>Using Azure CLI</a:t>
+            </a:r>
+            <a:endParaRPr lang="en-US" dirty="0"/>
+          </a:p>
+        </p:txBody>
+      </p:sp>
+      <p:sp>
+        <p:nvSpPr>
+          <p:cNvPr id="3" name="Content Placeholder 2"/>
+          <p:cNvSpPr>
+            <a:spLocks noGrp="1"/>
+          </p:cNvSpPr>
+          <p:nvPr>
+            <p:ph idx="1"/>
+          </p:nvPr>
+        </p:nvSpPr>
+        <p:spPr/>
+        <p:txBody>
+          <a:bodyPr>
+            <a:normAutofit fontScale="92500" lnSpcReduction="10000"/>
+          </a:bodyPr>
+          <a:lstStyle/>
+          <a:p>
+            <a:r>
+              <a:rPr lang="en-US" dirty="0"/>
+              <a:t>Get authenticated with Microsoft </a:t>
+            </a:r>
+            <a:r>
+              <a:rPr lang="en-US" dirty="0" smtClean="0"/>
+              <a:t>Azure</a:t>
+            </a:r>
+          </a:p>
+          <a:p>
+            <a:pPr marL="457200" lvl="1" indent="0">
+              <a:buNone/>
+            </a:pPr>
+            <a:r>
+              <a:rPr lang="de-DE" sz="2600" dirty="0">
+                <a:latin typeface="Courier New" panose="02070309020205020404" pitchFamily="49" charset="0"/>
+                <a:cs typeface="Courier New" panose="02070309020205020404" pitchFamily="49" charset="0"/>
+              </a:rPr>
+              <a:t>azure </a:t>
+            </a:r>
+            <a:r>
+              <a:rPr lang="de-DE" sz="2600" dirty="0" smtClean="0">
+                <a:latin typeface="Courier New" panose="02070309020205020404" pitchFamily="49" charset="0"/>
+                <a:cs typeface="Courier New" panose="02070309020205020404" pitchFamily="49" charset="0"/>
+              </a:rPr>
+              <a:t>login</a:t>
+            </a:r>
+            <a:endParaRPr lang="en-US" sz="2600" dirty="0" smtClean="0"/>
+          </a:p>
+          <a:p>
+            <a:r>
+              <a:rPr lang="en-US" dirty="0" smtClean="0"/>
+              <a:t>Switch to Azure Resource Manager</a:t>
+            </a:r>
+          </a:p>
+          <a:p>
+            <a:pPr marL="457200" lvl="1" indent="0">
+              <a:buNone/>
+            </a:pPr>
+            <a:r>
+              <a:rPr lang="de-DE" sz="2600" dirty="0">
+                <a:latin typeface="Courier New" panose="02070309020205020404" pitchFamily="49" charset="0"/>
+                <a:cs typeface="Courier New" panose="02070309020205020404" pitchFamily="49" charset="0"/>
+              </a:rPr>
+              <a:t>azure config mode arm</a:t>
+            </a:r>
+            <a:r>
+              <a:rPr lang="en-US" sz="2600" dirty="0" smtClean="0">
+                <a:latin typeface="Courier New" panose="02070309020205020404" pitchFamily="49" charset="0"/>
+                <a:cs typeface="Courier New" panose="02070309020205020404" pitchFamily="49" charset="0"/>
+              </a:rPr>
+              <a:t> </a:t>
+            </a:r>
+            <a:endParaRPr lang="en-US" sz="2600" dirty="0">
+              <a:latin typeface="Courier New" panose="02070309020205020404" pitchFamily="49" charset="0"/>
+              <a:cs typeface="Courier New" panose="02070309020205020404" pitchFamily="49" charset="0"/>
+            </a:endParaRPr>
+          </a:p>
+          <a:p>
+            <a:r>
+              <a:rPr lang="en-US" dirty="0"/>
+              <a:t>Create a Resource Group</a:t>
+            </a:r>
+            <a:r>
+              <a:rPr lang="en-US" dirty="0" smtClean="0"/>
+              <a:t> </a:t>
+            </a:r>
+          </a:p>
+          <a:p>
+            <a:pPr marL="457200" lvl="2" indent="0">
+              <a:spcBef>
+                <a:spcPts val="1000"/>
+              </a:spcBef>
+              <a:buNone/>
+            </a:pPr>
+            <a:r>
+              <a:rPr lang="en-US" sz="2600" dirty="0">
+                <a:latin typeface="Courier New" panose="02070309020205020404" pitchFamily="49" charset="0"/>
+                <a:cs typeface="Courier New" panose="02070309020205020404" pitchFamily="49" charset="0"/>
+              </a:rPr>
+              <a:t>azure group create -n "</a:t>
+            </a:r>
+            <a:r>
+              <a:rPr lang="en-US" sz="2600" dirty="0" err="1">
+                <a:latin typeface="Courier New" panose="02070309020205020404" pitchFamily="49" charset="0"/>
+                <a:cs typeface="Courier New" panose="02070309020205020404" pitchFamily="49" charset="0"/>
+              </a:rPr>
+              <a:t>chatroomRG</a:t>
+            </a:r>
+            <a:r>
+              <a:rPr lang="en-US" sz="2600" dirty="0">
+                <a:latin typeface="Courier New" panose="02070309020205020404" pitchFamily="49" charset="0"/>
+                <a:cs typeface="Courier New" panose="02070309020205020404" pitchFamily="49" charset="0"/>
+              </a:rPr>
+              <a:t>" -l "East US"</a:t>
+            </a:r>
+            <a:r>
+              <a:rPr lang="en-US" sz="3000" dirty="0" smtClean="0">
+                <a:latin typeface="Courier New" panose="02070309020205020404" pitchFamily="49" charset="0"/>
+                <a:cs typeface="Courier New" panose="02070309020205020404" pitchFamily="49" charset="0"/>
+              </a:rPr>
+              <a:t> </a:t>
+            </a:r>
+            <a:endParaRPr lang="en-US" sz="3000" dirty="0">
+              <a:latin typeface="Courier New" panose="02070309020205020404" pitchFamily="49" charset="0"/>
+              <a:cs typeface="Courier New" panose="02070309020205020404" pitchFamily="49" charset="0"/>
+            </a:endParaRPr>
+          </a:p>
+          <a:p>
+            <a:r>
+              <a:rPr lang="en-US" dirty="0" smtClean="0"/>
+              <a:t>Create </a:t>
+            </a:r>
+            <a:r>
+              <a:rPr lang="en-US" dirty="0"/>
+              <a:t>the Azure resources using a </a:t>
+            </a:r>
+            <a:r>
+              <a:rPr lang="en-US" dirty="0" err="1"/>
+              <a:t>json</a:t>
+            </a:r>
+            <a:r>
+              <a:rPr lang="en-US" dirty="0"/>
+              <a:t> template</a:t>
+            </a:r>
+            <a:endParaRPr lang="en-US" dirty="0"/>
+          </a:p>
+          <a:p>
+            <a:pPr marL="457200" lvl="3" indent="0">
+              <a:spcBef>
+                <a:spcPts val="1000"/>
+              </a:spcBef>
+              <a:buNone/>
+            </a:pPr>
+            <a:r>
+              <a:rPr lang="en-US" sz="2600" dirty="0">
+                <a:latin typeface="Courier New" panose="02070309020205020404" pitchFamily="49" charset="0"/>
+                <a:cs typeface="Courier New" panose="02070309020205020404" pitchFamily="49" charset="0"/>
+              </a:rPr>
+              <a:t>azure group deployment create -f </a:t>
+            </a:r>
+            <a:r>
+              <a:rPr lang="en-US" sz="2600" dirty="0" err="1">
+                <a:latin typeface="Courier New" panose="02070309020205020404" pitchFamily="49" charset="0"/>
+                <a:cs typeface="Courier New" panose="02070309020205020404" pitchFamily="49" charset="0"/>
+              </a:rPr>
+              <a:t>azuredeploy.json</a:t>
+            </a:r>
+            <a:r>
+              <a:rPr lang="en-US" sz="2600" dirty="0">
+                <a:latin typeface="Courier New" panose="02070309020205020404" pitchFamily="49" charset="0"/>
+                <a:cs typeface="Courier New" panose="02070309020205020404" pitchFamily="49" charset="0"/>
+              </a:rPr>
+              <a:t> </a:t>
+            </a:r>
+            <a:r>
+              <a:rPr lang="en-US" sz="2600" dirty="0" smtClean="0">
+                <a:latin typeface="Courier New" panose="02070309020205020404" pitchFamily="49" charset="0"/>
+                <a:cs typeface="Courier New" panose="02070309020205020404" pitchFamily="49" charset="0"/>
+              </a:rPr>
+              <a:t>–e </a:t>
+            </a:r>
+            <a:r>
+              <a:rPr lang="en-US" sz="2600" dirty="0" err="1" smtClean="0">
+                <a:latin typeface="Courier New" panose="02070309020205020404" pitchFamily="49" charset="0"/>
+                <a:cs typeface="Courier New" panose="02070309020205020404" pitchFamily="49" charset="0"/>
+              </a:rPr>
+              <a:t>azuredeploy.parameters.json</a:t>
+            </a:r>
+            <a:r>
+              <a:rPr lang="en-US" sz="2600" dirty="0" smtClean="0">
+                <a:latin typeface="Courier New" panose="02070309020205020404" pitchFamily="49" charset="0"/>
+                <a:cs typeface="Courier New" panose="02070309020205020404" pitchFamily="49" charset="0"/>
+              </a:rPr>
+              <a:t> </a:t>
+            </a:r>
+            <a:r>
+              <a:rPr lang="en-US" sz="2600" dirty="0" err="1">
+                <a:latin typeface="Courier New" panose="02070309020205020404" pitchFamily="49" charset="0"/>
+                <a:cs typeface="Courier New" panose="02070309020205020404" pitchFamily="49" charset="0"/>
+              </a:rPr>
+              <a:t>chatroomRG</a:t>
+            </a:r>
+            <a:r>
+              <a:rPr lang="en-US" sz="2600" dirty="0">
+                <a:latin typeface="Courier New" panose="02070309020205020404" pitchFamily="49" charset="0"/>
+                <a:cs typeface="Courier New" panose="02070309020205020404" pitchFamily="49" charset="0"/>
+              </a:rPr>
+              <a:t> </a:t>
+            </a:r>
+            <a:r>
+              <a:rPr lang="en-US" sz="2600" dirty="0" err="1">
+                <a:latin typeface="Courier New" panose="02070309020205020404" pitchFamily="49" charset="0"/>
+                <a:cs typeface="Courier New" panose="02070309020205020404" pitchFamily="49" charset="0"/>
+              </a:rPr>
+              <a:t>chatroomDeploy</a:t>
+            </a:r>
+            <a:r>
+              <a:rPr lang="en-US" dirty="0" smtClean="0">
+                <a:latin typeface="Courier New" panose="02070309020205020404" pitchFamily="49" charset="0"/>
+                <a:cs typeface="Courier New" panose="02070309020205020404" pitchFamily="49" charset="0"/>
+              </a:rPr>
+              <a:t> </a:t>
+            </a:r>
+          </a:p>
+          <a:p>
+            <a:pPr marL="0" indent="0">
+              <a:buNone/>
+            </a:pPr>
+            <a:endParaRPr lang="en-US" dirty="0"/>
+          </a:p>
+        </p:txBody>
+      </p:sp>
+    </p:spTree>
+    <p:extLst>
+      <p:ext uri="{BB962C8B-B14F-4D97-AF65-F5344CB8AC3E}">
+        <p14:creationId xmlns:p14="http://schemas.microsoft.com/office/powerpoint/2010/main" val="3890587178"/>
+      </p:ext>
+    </p:extLst>
+  </p:cSld>
+  <p:clrMapOvr>
+    <a:masterClrMapping/>
+  </p:clrMapOvr>
+  <mc:AlternateContent xmlns:mc="http://schemas.openxmlformats.org/markup-compatibility/2006" xmlns:p14="http://schemas.microsoft.com/office/powerpoint/2010/main">
+    <mc:Choice Requires="p14">
+      <p:transition spd="med" p14:dur="700">
+        <p:fade/>
+      </p:transition>
+    </mc:Choice>
+    <mc:Fallback xmlns="">
+      <p:transition spd="med">
+        <p:fade/>
+      </p:transition>
+    </mc:Fallback>
+  </mc:AlternateContent>
+  <p:timing>
+    <p:tnLst>
+      <p:par>
+        <p:cTn id="1" dur="indefinite" restart="never" nodeType="tmRoot"/>
+      </p:par>
+    </p:tnLst>
+  </p:timing>
+</p:sld>
+</file>
+
+<file path=ppt/slides/slide11.xml><?xml version="1.0" encoding="utf-8"?>
+<p:sld xmlns:a="http://schemas.openxmlformats.org/drawingml/2006/main" xmlns:r="http://schemas.openxmlformats.org/officeDocument/2006/relationships" xmlns:p="http://schemas.openxmlformats.org/presentationml/2006/main">
+  <p:cSld>
+    <p:spTree>
+      <p:nvGrpSpPr>
+        <p:cNvPr id="1" name=""/>
+        <p:cNvGrpSpPr/>
+        <p:nvPr/>
+      </p:nvGrpSpPr>
+      <p:grpSpPr>
+        <a:xfrm>
+          <a:off x="0" y="0"/>
+          <a:ext cx="0" cy="0"/>
+          <a:chOff x="0" y="0"/>
+          <a:chExt cx="0" cy="0"/>
+        </a:xfrm>
+      </p:grpSpPr>
+      <p:sp>
+        <p:nvSpPr>
+          <p:cNvPr id="3" name="Subtitle 2"/>
+          <p:cNvSpPr>
+            <a:spLocks noGrp="1"/>
+          </p:cNvSpPr>
+          <p:nvPr>
+            <p:ph type="subTitle" idx="1"/>
+          </p:nvPr>
+        </p:nvSpPr>
+        <p:spPr/>
+        <p:txBody>
+          <a:bodyPr/>
+          <a:lstStyle/>
+          <a:p>
+            <a:r>
+              <a:rPr lang="en-US" dirty="0"/>
+              <a:t>Provisioning Azure Resources using Azure CLI</a:t>
+            </a:r>
+            <a:endParaRPr lang="en-US" dirty="0"/>
+          </a:p>
+        </p:txBody>
+      </p:sp>
+    </p:spTree>
+    <p:extLst>
+      <p:ext uri="{BB962C8B-B14F-4D97-AF65-F5344CB8AC3E}">
+        <p14:creationId xmlns:p14="http://schemas.microsoft.com/office/powerpoint/2010/main" val="1834329435"/>
+      </p:ext>
+    </p:extLst>
+  </p:cSld>
+  <p:clrMapOvr>
+    <a:masterClrMapping/>
+  </p:clrMapOvr>
+  <mc:AlternateContent xmlns:mc="http://schemas.openxmlformats.org/markup-compatibility/2006" xmlns:p14="http://schemas.microsoft.com/office/powerpoint/2010/main">
+    <mc:Choice Requires="p14">
+      <p:transition spd="med" p14:dur="700">
+        <p:fade/>
+      </p:transition>
+    </mc:Choice>
+    <mc:Fallback xmlns="">
+      <p:transition spd="med">
+        <p:fade/>
+      </p:transition>
+    </mc:Fallback>
+  </mc:AlternateContent>
+  <p:timing>
+    <p:tnLst>
+      <p:par>
+        <p:cTn id="1" dur="indefinite" restart="never" nodeType="tmRoot"/>
+      </p:par>
+    </p:tnLst>
+  </p:timing>
+</p:sld>
+</file>
+
+<file path=ppt/slides/slide12.xml><?xml version="1.0" encoding="utf-8"?>
+<p:sld xmlns:a="http://schemas.openxmlformats.org/drawingml/2006/main" xmlns:r="http://schemas.openxmlformats.org/officeDocument/2006/relationships" xmlns:p="http://schemas.openxmlformats.org/presentationml/2006/main">
+  <p:cSld>
+    <p:spTree>
+      <p:nvGrpSpPr>
+        <p:cNvPr id="1" name=""/>
+        <p:cNvGrpSpPr/>
+        <p:nvPr/>
+      </p:nvGrpSpPr>
+      <p:grpSpPr>
+        <a:xfrm>
+          <a:off x="0" y="0"/>
+          <a:ext cx="0" cy="0"/>
+          <a:chOff x="0" y="0"/>
+          <a:chExt cx="0" cy="0"/>
+        </a:xfrm>
+      </p:grpSpPr>
+      <p:sp>
+        <p:nvSpPr>
           <p:cNvPr id="4" name="Title 3"/>
           <p:cNvSpPr>
             <a:spLocks noGrp="1"/>
@@ -18169,13 +18552,543 @@
           <a:p>
             <a:r>
               <a:rPr lang="en-US" dirty="0"/>
-              <a:t>Deploying to Azure with </a:t>
+              <a:t>Deploying to </a:t>
+            </a:r>
+            <a:r>
+              <a:rPr lang="en-US" dirty="0" smtClean="0"/>
+              <a:t>Azure</a:t>
+            </a:r>
+            <a:br>
+              <a:rPr lang="en-US" dirty="0" smtClean="0"/>
+            </a:br>
+            <a:r>
+              <a:rPr lang="en-US" dirty="0" smtClean="0"/>
+              <a:t>with Visual </a:t>
             </a:r>
             <a:r>
               <a:rPr lang="en-US" dirty="0"/>
-              <a:t>GitHub</a:t>
-            </a:r>
-            <a:endParaRPr lang="en-US" dirty="0"/>
+              <a:t>Studio</a:t>
+            </a:r>
+          </a:p>
+        </p:txBody>
+      </p:sp>
+    </p:spTree>
+    <p:extLst>
+      <p:ext uri="{BB962C8B-B14F-4D97-AF65-F5344CB8AC3E}">
+        <p14:creationId xmlns:p14="http://schemas.microsoft.com/office/powerpoint/2010/main" val="2325426732"/>
+      </p:ext>
+    </p:extLst>
+  </p:cSld>
+  <p:clrMapOvr>
+    <a:masterClrMapping/>
+  </p:clrMapOvr>
+  <mc:AlternateContent xmlns:mc="http://schemas.openxmlformats.org/markup-compatibility/2006" xmlns:p14="http://schemas.microsoft.com/office/powerpoint/2010/main">
+    <mc:Choice Requires="p14">
+      <p:transition spd="med" p14:dur="700">
+        <p:fade/>
+      </p:transition>
+    </mc:Choice>
+    <mc:Fallback xmlns="">
+      <p:transition spd="med">
+        <p:fade/>
+      </p:transition>
+    </mc:Fallback>
+  </mc:AlternateContent>
+  <p:timing>
+    <p:tnLst>
+      <p:par>
+        <p:cTn id="1" dur="indefinite" restart="never" nodeType="tmRoot"/>
+      </p:par>
+    </p:tnLst>
+  </p:timing>
+</p:sld>
+</file>
+
+<file path=ppt/slides/slide13.xml><?xml version="1.0" encoding="utf-8"?>
+<p:sld xmlns:a="http://schemas.openxmlformats.org/drawingml/2006/main" xmlns:r="http://schemas.openxmlformats.org/officeDocument/2006/relationships" xmlns:p="http://schemas.openxmlformats.org/presentationml/2006/main">
+  <p:cSld>
+    <p:spTree>
+      <p:nvGrpSpPr>
+        <p:cNvPr id="1" name=""/>
+        <p:cNvGrpSpPr/>
+        <p:nvPr/>
+      </p:nvGrpSpPr>
+      <p:grpSpPr>
+        <a:xfrm>
+          <a:off x="0" y="0"/>
+          <a:ext cx="0" cy="0"/>
+          <a:chOff x="0" y="0"/>
+          <a:chExt cx="0" cy="0"/>
+        </a:xfrm>
+      </p:grpSpPr>
+      <p:sp>
+        <p:nvSpPr>
+          <p:cNvPr id="3" name="Title 2"/>
+          <p:cNvSpPr>
+            <a:spLocks noGrp="1"/>
+          </p:cNvSpPr>
+          <p:nvPr>
+            <p:ph type="title"/>
+          </p:nvPr>
+        </p:nvSpPr>
+        <p:spPr/>
+        <p:txBody>
+          <a:bodyPr anchor="ctr">
+            <a:normAutofit fontScale="90000"/>
+          </a:bodyPr>
+          <a:lstStyle/>
+          <a:p>
+            <a:pPr marL="252000">
+              <a:spcBef>
+                <a:spcPts val="0"/>
+              </a:spcBef>
+            </a:pPr>
+            <a:r>
+              <a:rPr lang="en-US" dirty="0"/>
+              <a:t>Visual Studio + App Service Web Apps</a:t>
+            </a:r>
+          </a:p>
+        </p:txBody>
+      </p:sp>
+      <p:sp>
+        <p:nvSpPr>
+          <p:cNvPr id="4" name="Content Placeholder 3"/>
+          <p:cNvSpPr>
+            <a:spLocks noGrp="1"/>
+          </p:cNvSpPr>
+          <p:nvPr>
+            <p:ph idx="1"/>
+          </p:nvPr>
+        </p:nvSpPr>
+        <p:spPr/>
+        <p:txBody>
+          <a:bodyPr/>
+          <a:lstStyle/>
+          <a:p>
+            <a:pPr marL="0" indent="0">
+              <a:buNone/>
+            </a:pPr>
+            <a:r>
+              <a:rPr lang="en-US" sz="3200" dirty="0">
+                <a:solidFill>
+                  <a:schemeClr val="tx1"/>
+                </a:solidFill>
+              </a:rPr>
+              <a:t>Create Azure Resources during File / New</a:t>
+            </a:r>
+          </a:p>
+          <a:p>
+            <a:pPr marL="0" indent="0">
+              <a:buNone/>
+            </a:pPr>
+            <a:r>
+              <a:rPr lang="en-US" sz="3200" dirty="0">
+                <a:solidFill>
+                  <a:schemeClr val="tx1"/>
+                </a:solidFill>
+              </a:rPr>
+              <a:t>Create Web App during deploy</a:t>
+            </a:r>
+          </a:p>
+          <a:p>
+            <a:pPr marL="0" indent="0">
+              <a:buNone/>
+            </a:pPr>
+            <a:r>
+              <a:rPr lang="en-US" sz="3200" dirty="0">
+                <a:solidFill>
+                  <a:schemeClr val="tx1"/>
+                </a:solidFill>
+              </a:rPr>
+              <a:t>Manage with Server Explorer</a:t>
+            </a:r>
+          </a:p>
+          <a:p>
+            <a:pPr marL="0" indent="0">
+              <a:buNone/>
+            </a:pPr>
+            <a:endParaRPr lang="en-US" sz="3200" dirty="0">
+              <a:solidFill>
+                <a:schemeClr val="tx1"/>
+              </a:solidFill>
+            </a:endParaRPr>
+          </a:p>
+        </p:txBody>
+      </p:sp>
+      <p:sp>
+        <p:nvSpPr>
+          <p:cNvPr id="6" name="Content Placeholder 2"/>
+          <p:cNvSpPr txBox="1">
+            <a:spLocks/>
+          </p:cNvSpPr>
+          <p:nvPr/>
+        </p:nvSpPr>
+        <p:spPr>
+          <a:xfrm>
+            <a:off x="274712" y="441435"/>
+            <a:ext cx="12192000" cy="5266267"/>
+          </a:xfrm>
+          <a:prstGeom prst="rect">
+            <a:avLst/>
+          </a:prstGeom>
+        </p:spPr>
+        <p:txBody>
+          <a:bodyPr vert="horz" lIns="91440" tIns="45720" rIns="91440" bIns="45720" rtlCol="0" anchor="ctr">
+            <a:noAutofit/>
+          </a:bodyPr>
+          <a:lstStyle>
+            <a:lvl1pPr marL="228600" indent="-228600" algn="l" defTabSz="914400" rtl="0" eaLnBrk="1" latinLnBrk="0" hangingPunct="1">
+              <a:lnSpc>
+                <a:spcPct val="90000"/>
+              </a:lnSpc>
+              <a:spcBef>
+                <a:spcPts val="1000"/>
+              </a:spcBef>
+              <a:buFont typeface="Arial" panose="020B0604020202020204" pitchFamily="34" charset="0"/>
+              <a:buChar char="•"/>
+              <a:defRPr sz="3600" kern="1200">
+                <a:solidFill>
+                  <a:schemeClr val="bg1"/>
+                </a:solidFill>
+                <a:latin typeface="+mn-lt"/>
+                <a:ea typeface="+mn-ea"/>
+                <a:cs typeface="+mn-cs"/>
+              </a:defRPr>
+            </a:lvl1pPr>
+            <a:lvl2pPr marL="685800" indent="-228600" algn="l" defTabSz="914400" rtl="0" eaLnBrk="1" latinLnBrk="0" hangingPunct="1">
+              <a:lnSpc>
+                <a:spcPct val="90000"/>
+              </a:lnSpc>
+              <a:spcBef>
+                <a:spcPts val="500"/>
+              </a:spcBef>
+              <a:buFont typeface="Arial" panose="020B0604020202020204" pitchFamily="34" charset="0"/>
+              <a:buChar char="•"/>
+              <a:defRPr sz="3200" kern="1200">
+                <a:solidFill>
+                  <a:schemeClr val="bg1"/>
+                </a:solidFill>
+                <a:latin typeface="+mn-lt"/>
+                <a:ea typeface="+mn-ea"/>
+                <a:cs typeface="+mn-cs"/>
+              </a:defRPr>
+            </a:lvl2pPr>
+            <a:lvl3pPr marL="1143000" indent="-228600" algn="l" defTabSz="914400" rtl="0" eaLnBrk="1" latinLnBrk="0" hangingPunct="1">
+              <a:lnSpc>
+                <a:spcPct val="90000"/>
+              </a:lnSpc>
+              <a:spcBef>
+                <a:spcPts val="500"/>
+              </a:spcBef>
+              <a:buFont typeface="Arial" panose="020B0604020202020204" pitchFamily="34" charset="0"/>
+              <a:buChar char="•"/>
+              <a:defRPr sz="2800" kern="1200">
+                <a:solidFill>
+                  <a:schemeClr val="bg1"/>
+                </a:solidFill>
+                <a:latin typeface="+mn-lt"/>
+                <a:ea typeface="+mn-ea"/>
+                <a:cs typeface="+mn-cs"/>
+              </a:defRPr>
+            </a:lvl3pPr>
+            <a:lvl4pPr marL="1600200" indent="-228600" algn="l" defTabSz="914400" rtl="0" eaLnBrk="1" latinLnBrk="0" hangingPunct="1">
+              <a:lnSpc>
+                <a:spcPct val="90000"/>
+              </a:lnSpc>
+              <a:spcBef>
+                <a:spcPts val="500"/>
+              </a:spcBef>
+              <a:buFont typeface="Arial" panose="020B0604020202020204" pitchFamily="34" charset="0"/>
+              <a:buChar char="•"/>
+              <a:defRPr sz="2400" kern="1200">
+                <a:solidFill>
+                  <a:schemeClr val="bg1"/>
+                </a:solidFill>
+                <a:latin typeface="+mn-lt"/>
+                <a:ea typeface="+mn-ea"/>
+                <a:cs typeface="+mn-cs"/>
+              </a:defRPr>
+            </a:lvl4pPr>
+            <a:lvl5pPr marL="2057400" indent="-228600" algn="l" defTabSz="914400" rtl="0" eaLnBrk="1" latinLnBrk="0" hangingPunct="1">
+              <a:lnSpc>
+                <a:spcPct val="90000"/>
+              </a:lnSpc>
+              <a:spcBef>
+                <a:spcPts val="500"/>
+              </a:spcBef>
+              <a:buFont typeface="Arial" panose="020B0604020202020204" pitchFamily="34" charset="0"/>
+              <a:buChar char="•"/>
+              <a:defRPr sz="2400" kern="1200">
+                <a:solidFill>
+                  <a:schemeClr val="bg1"/>
+                </a:solidFill>
+                <a:latin typeface="+mn-lt"/>
+                <a:ea typeface="+mn-ea"/>
+                <a:cs typeface="+mn-cs"/>
+              </a:defRPr>
+            </a:lvl5pPr>
+            <a:lvl6pPr marL="2514600" indent="-228600" algn="l" defTabSz="914400" rtl="0" eaLnBrk="1" latinLnBrk="0" hangingPunct="1">
+              <a:lnSpc>
+                <a:spcPct val="90000"/>
+              </a:lnSpc>
+              <a:spcBef>
+                <a:spcPts val="500"/>
+              </a:spcBef>
+              <a:buFont typeface="Arial" panose="020B0604020202020204" pitchFamily="34" charset="0"/>
+              <a:buChar char="•"/>
+              <a:defRPr sz="1800" kern="1200">
+                <a:solidFill>
+                  <a:schemeClr val="tx1"/>
+                </a:solidFill>
+                <a:latin typeface="+mn-lt"/>
+                <a:ea typeface="+mn-ea"/>
+                <a:cs typeface="+mn-cs"/>
+              </a:defRPr>
+            </a:lvl6pPr>
+            <a:lvl7pPr marL="2971800" indent="-228600" algn="l" defTabSz="914400" rtl="0" eaLnBrk="1" latinLnBrk="0" hangingPunct="1">
+              <a:lnSpc>
+                <a:spcPct val="90000"/>
+              </a:lnSpc>
+              <a:spcBef>
+                <a:spcPts val="500"/>
+              </a:spcBef>
+              <a:buFont typeface="Arial" panose="020B0604020202020204" pitchFamily="34" charset="0"/>
+              <a:buChar char="•"/>
+              <a:defRPr sz="1800" kern="1200">
+                <a:solidFill>
+                  <a:schemeClr val="tx1"/>
+                </a:solidFill>
+                <a:latin typeface="+mn-lt"/>
+                <a:ea typeface="+mn-ea"/>
+                <a:cs typeface="+mn-cs"/>
+              </a:defRPr>
+            </a:lvl7pPr>
+            <a:lvl8pPr marL="3429000" indent="-228600" algn="l" defTabSz="914400" rtl="0" eaLnBrk="1" latinLnBrk="0" hangingPunct="1">
+              <a:lnSpc>
+                <a:spcPct val="90000"/>
+              </a:lnSpc>
+              <a:spcBef>
+                <a:spcPts val="500"/>
+              </a:spcBef>
+              <a:buFont typeface="Arial" panose="020B0604020202020204" pitchFamily="34" charset="0"/>
+              <a:buChar char="•"/>
+              <a:defRPr sz="1800" kern="1200">
+                <a:solidFill>
+                  <a:schemeClr val="tx1"/>
+                </a:solidFill>
+                <a:latin typeface="+mn-lt"/>
+                <a:ea typeface="+mn-ea"/>
+                <a:cs typeface="+mn-cs"/>
+              </a:defRPr>
+            </a:lvl8pPr>
+            <a:lvl9pPr marL="3886200" indent="-228600" algn="l" defTabSz="914400" rtl="0" eaLnBrk="1" latinLnBrk="0" hangingPunct="1">
+              <a:lnSpc>
+                <a:spcPct val="90000"/>
+              </a:lnSpc>
+              <a:spcBef>
+                <a:spcPts val="500"/>
+              </a:spcBef>
+              <a:buFont typeface="Arial" panose="020B0604020202020204" pitchFamily="34" charset="0"/>
+              <a:buChar char="•"/>
+              <a:defRPr sz="1800" kern="1200">
+                <a:solidFill>
+                  <a:schemeClr val="tx1"/>
+                </a:solidFill>
+                <a:latin typeface="+mn-lt"/>
+                <a:ea typeface="+mn-ea"/>
+                <a:cs typeface="+mn-cs"/>
+              </a:defRPr>
+            </a:lvl9pPr>
+          </a:lstStyle>
+          <a:p>
+            <a:pPr marL="252000" indent="0">
+              <a:spcBef>
+                <a:spcPts val="0"/>
+              </a:spcBef>
+              <a:spcAft>
+                <a:spcPts val="1800"/>
+              </a:spcAft>
+              <a:buNone/>
+            </a:pPr>
+            <a:endParaRPr lang="en-US" dirty="0">
+              <a:solidFill>
+                <a:schemeClr val="tx1"/>
+              </a:solidFill>
+            </a:endParaRPr>
+          </a:p>
+        </p:txBody>
+      </p:sp>
+      <p:pic>
+        <p:nvPicPr>
+          <p:cNvPr id="7" name="Content Placeholder 4"/>
+          <p:cNvPicPr>
+            <a:picLocks noChangeAspect="1"/>
+          </p:cNvPicPr>
+          <p:nvPr/>
+        </p:nvPicPr>
+        <p:blipFill>
+          <a:blip r:embed="rId2" cstate="email">
+            <a:extLst>
+              <a:ext uri="{28A0092B-C50C-407E-A947-70E740481C1C}">
+                <a14:useLocalDpi xmlns:a14="http://schemas.microsoft.com/office/drawing/2010/main" val="0"/>
+              </a:ext>
+            </a:extLst>
+          </a:blip>
+          <a:stretch>
+            <a:fillRect/>
+          </a:stretch>
+        </p:blipFill>
+        <p:spPr>
+          <a:xfrm>
+            <a:off x="7530127" y="3373187"/>
+            <a:ext cx="4110493" cy="2719388"/>
+          </a:xfrm>
+          <a:prstGeom prst="rect">
+            <a:avLst/>
+          </a:prstGeom>
+        </p:spPr>
+      </p:pic>
+    </p:spTree>
+    <p:extLst>
+      <p:ext uri="{BB962C8B-B14F-4D97-AF65-F5344CB8AC3E}">
+        <p14:creationId xmlns:p14="http://schemas.microsoft.com/office/powerpoint/2010/main" val="1239248924"/>
+      </p:ext>
+    </p:extLst>
+  </p:cSld>
+  <p:clrMapOvr>
+    <a:masterClrMapping/>
+  </p:clrMapOvr>
+  <mc:AlternateContent xmlns:mc="http://schemas.openxmlformats.org/markup-compatibility/2006" xmlns:p14="http://schemas.microsoft.com/office/powerpoint/2010/main">
+    <mc:Choice Requires="p14">
+      <p:transition spd="med" p14:dur="700">
+        <p:fade/>
+      </p:transition>
+    </mc:Choice>
+    <mc:Fallback xmlns="">
+      <p:transition spd="med">
+        <p:fade/>
+      </p:transition>
+    </mc:Fallback>
+  </mc:AlternateContent>
+  <p:timing>
+    <p:tnLst>
+      <p:par>
+        <p:cTn id="1" dur="indefinite" restart="never" nodeType="tmRoot"/>
+      </p:par>
+    </p:tnLst>
+  </p:timing>
+</p:sld>
+</file>
+
+<file path=ppt/slides/slide14.xml><?xml version="1.0" encoding="utf-8"?>
+<p:sld xmlns:a="http://schemas.openxmlformats.org/drawingml/2006/main" xmlns:r="http://schemas.openxmlformats.org/officeDocument/2006/relationships" xmlns:p="http://schemas.openxmlformats.org/presentationml/2006/main">
+  <p:cSld>
+    <p:spTree>
+      <p:nvGrpSpPr>
+        <p:cNvPr id="1" name=""/>
+        <p:cNvGrpSpPr/>
+        <p:nvPr/>
+      </p:nvGrpSpPr>
+      <p:grpSpPr>
+        <a:xfrm>
+          <a:off x="0" y="0"/>
+          <a:ext cx="0" cy="0"/>
+          <a:chOff x="0" y="0"/>
+          <a:chExt cx="0" cy="0"/>
+        </a:xfrm>
+      </p:grpSpPr>
+      <p:sp>
+        <p:nvSpPr>
+          <p:cNvPr id="3" name="Subtitle 2"/>
+          <p:cNvSpPr>
+            <a:spLocks noGrp="1"/>
+          </p:cNvSpPr>
+          <p:nvPr>
+            <p:ph type="subTitle" idx="1"/>
+          </p:nvPr>
+        </p:nvSpPr>
+        <p:spPr/>
+        <p:txBody>
+          <a:bodyPr/>
+          <a:lstStyle/>
+          <a:p>
+            <a:r>
+              <a:rPr lang="en-US" dirty="0"/>
+              <a:t>Deploying to Azure with Visual Studio</a:t>
+            </a:r>
+          </a:p>
+        </p:txBody>
+      </p:sp>
+    </p:spTree>
+    <p:extLst>
+      <p:ext uri="{BB962C8B-B14F-4D97-AF65-F5344CB8AC3E}">
+        <p14:creationId xmlns:p14="http://schemas.microsoft.com/office/powerpoint/2010/main" val="2548092044"/>
+      </p:ext>
+    </p:extLst>
+  </p:cSld>
+  <p:clrMapOvr>
+    <a:masterClrMapping/>
+  </p:clrMapOvr>
+  <mc:AlternateContent xmlns:mc="http://schemas.openxmlformats.org/markup-compatibility/2006" xmlns:p14="http://schemas.microsoft.com/office/powerpoint/2010/main">
+    <mc:Choice Requires="p14">
+      <p:transition spd="med" p14:dur="700">
+        <p:fade/>
+      </p:transition>
+    </mc:Choice>
+    <mc:Fallback xmlns="">
+      <p:transition spd="med">
+        <p:fade/>
+      </p:transition>
+    </mc:Fallback>
+  </mc:AlternateContent>
+  <p:timing>
+    <p:tnLst>
+      <p:par>
+        <p:cTn id="1" dur="indefinite" restart="never" nodeType="tmRoot"/>
+      </p:par>
+    </p:tnLst>
+  </p:timing>
+</p:sld>
+</file>
+
+<file path=ppt/slides/slide15.xml><?xml version="1.0" encoding="utf-8"?>
+<p:sld xmlns:a="http://schemas.openxmlformats.org/drawingml/2006/main" xmlns:r="http://schemas.openxmlformats.org/officeDocument/2006/relationships" xmlns:p="http://schemas.openxmlformats.org/presentationml/2006/main">
+  <p:cSld>
+    <p:spTree>
+      <p:nvGrpSpPr>
+        <p:cNvPr id="1" name=""/>
+        <p:cNvGrpSpPr/>
+        <p:nvPr/>
+      </p:nvGrpSpPr>
+      <p:grpSpPr>
+        <a:xfrm>
+          <a:off x="0" y="0"/>
+          <a:ext cx="0" cy="0"/>
+          <a:chOff x="0" y="0"/>
+          <a:chExt cx="0" cy="0"/>
+        </a:xfrm>
+      </p:grpSpPr>
+      <p:sp>
+        <p:nvSpPr>
+          <p:cNvPr id="4" name="Title 3"/>
+          <p:cNvSpPr>
+            <a:spLocks noGrp="1"/>
+          </p:cNvSpPr>
+          <p:nvPr>
+            <p:ph type="ctrTitle"/>
+          </p:nvPr>
+        </p:nvSpPr>
+        <p:spPr/>
+        <p:txBody>
+          <a:bodyPr>
+            <a:normAutofit/>
+          </a:bodyPr>
+          <a:lstStyle/>
+          <a:p>
+            <a:r>
+              <a:rPr lang="en-US" dirty="0"/>
+              <a:t>Deploying to Azure with GitHub</a:t>
+            </a:r>
           </a:p>
         </p:txBody>
       </p:sp>
@@ -18211,7 +19124,7 @@
 </p:sld>
 </file>
 
-<file path=ppt/slides/slide11.xml><?xml version="1.0" encoding="utf-8"?>
+<file path=ppt/slides/slide16.xml><?xml version="1.0" encoding="utf-8"?>
 <p:sld xmlns:a="http://schemas.openxmlformats.org/drawingml/2006/main" xmlns:r="http://schemas.openxmlformats.org/officeDocument/2006/relationships" xmlns:p="http://schemas.openxmlformats.org/presentationml/2006/main">
   <p:cSld>
     <p:spTree>
@@ -18946,7 +19859,7 @@
 </p:sld>
 </file>
 
-<file path=ppt/slides/slide12.xml><?xml version="1.0" encoding="utf-8"?>
+<file path=ppt/slides/slide17.xml><?xml version="1.0" encoding="utf-8"?>
 <p:sld xmlns:a="http://schemas.openxmlformats.org/drawingml/2006/main" xmlns:r="http://schemas.openxmlformats.org/officeDocument/2006/relationships" xmlns:p="http://schemas.openxmlformats.org/presentationml/2006/main">
   <p:cSld>
     <p:bg>
@@ -19579,7 +20492,7 @@
 </p:sld>
 </file>
 
-<file path=ppt/slides/slide13.xml><?xml version="1.0" encoding="utf-8"?>
+<file path=ppt/slides/slide18.xml><?xml version="1.0" encoding="utf-8"?>
 <p:sld xmlns:a="http://schemas.openxmlformats.org/drawingml/2006/main" xmlns:r="http://schemas.openxmlformats.org/officeDocument/2006/relationships" xmlns:p="http://schemas.openxmlformats.org/presentationml/2006/main">
   <p:cSld>
     <p:spTree>
@@ -19675,7 +20588,7 @@
 </p:sld>
 </file>
 
-<file path=ppt/slides/slide14.xml><?xml version="1.0" encoding="utf-8"?>
+<file path=ppt/slides/slide19.xml><?xml version="1.0" encoding="utf-8"?>
 <p:sld xmlns:a="http://schemas.openxmlformats.org/drawingml/2006/main" xmlns:r="http://schemas.openxmlformats.org/officeDocument/2006/relationships" xmlns:p="http://schemas.openxmlformats.org/presentationml/2006/main">
   <p:cSld>
     <p:spTree>
@@ -19709,13 +20622,8 @@
           <a:p>
             <a:r>
               <a:rPr lang="en-US" dirty="0"/>
-              <a:t>Deploying to Azure with </a:t>
-            </a:r>
-            <a:r>
-              <a:rPr lang="en-US" dirty="0"/>
-              <a:t>GitHub</a:t>
-            </a:r>
-            <a:endParaRPr lang="en-US" dirty="0"/>
+              <a:t>Deploying to Azure with GitHub</a:t>
+            </a:r>
           </a:p>
         </p:txBody>
       </p:sp>
@@ -19751,7 +20659,161 @@
 </p:sld>
 </file>
 
-<file path=ppt/slides/slide15.xml><?xml version="1.0" encoding="utf-8"?>
+<file path=ppt/slides/slide2.xml><?xml version="1.0" encoding="utf-8"?>
+<p:sld xmlns:a="http://schemas.openxmlformats.org/drawingml/2006/main" xmlns:r="http://schemas.openxmlformats.org/officeDocument/2006/relationships" xmlns:p="http://schemas.openxmlformats.org/presentationml/2006/main">
+  <p:cSld>
+    <p:spTree>
+      <p:nvGrpSpPr>
+        <p:cNvPr id="1" name=""/>
+        <p:cNvGrpSpPr/>
+        <p:nvPr/>
+      </p:nvGrpSpPr>
+      <p:grpSpPr>
+        <a:xfrm>
+          <a:off x="0" y="0"/>
+          <a:ext cx="0" cy="0"/>
+          <a:chOff x="0" y="0"/>
+          <a:chExt cx="0" cy="0"/>
+        </a:xfrm>
+      </p:grpSpPr>
+      <p:sp>
+        <p:nvSpPr>
+          <p:cNvPr id="2" name="Title 1"/>
+          <p:cNvSpPr>
+            <a:spLocks noGrp="1"/>
+          </p:cNvSpPr>
+          <p:nvPr>
+            <p:ph type="title"/>
+          </p:nvPr>
+        </p:nvSpPr>
+        <p:spPr/>
+        <p:txBody>
+          <a:bodyPr/>
+          <a:lstStyle/>
+          <a:p>
+            <a:r>
+              <a:rPr lang="en-US" smtClean="0"/>
+              <a:t>Agenda</a:t>
+            </a:r>
+            <a:endParaRPr lang="en-US" dirty="0"/>
+          </a:p>
+        </p:txBody>
+      </p:sp>
+      <p:sp>
+        <p:nvSpPr>
+          <p:cNvPr id="7" name="Content Placeholder 6"/>
+          <p:cNvSpPr>
+            <a:spLocks noGrp="1"/>
+          </p:cNvSpPr>
+          <p:nvPr>
+            <p:ph idx="1"/>
+          </p:nvPr>
+        </p:nvSpPr>
+        <p:spPr/>
+        <p:txBody>
+          <a:bodyPr>
+            <a:normAutofit/>
+          </a:bodyPr>
+          <a:lstStyle/>
+          <a:p>
+            <a:pPr marL="742950" indent="-742950">
+              <a:buFont typeface="+mj-lt"/>
+              <a:buAutoNum type="arabicParenR"/>
+            </a:pPr>
+            <a:r>
+              <a:rPr lang="en-GB" dirty="0" smtClean="0"/>
+              <a:t>Azure Web Apps </a:t>
+            </a:r>
+            <a:r>
+              <a:rPr lang="en-GB" dirty="0" smtClean="0"/>
+              <a:t>Overview</a:t>
+            </a:r>
+          </a:p>
+          <a:p>
+            <a:pPr marL="742950" indent="-742950">
+              <a:buFont typeface="+mj-lt"/>
+              <a:buAutoNum type="arabicParenR"/>
+            </a:pPr>
+            <a:r>
+              <a:rPr lang="en-GB" dirty="0" smtClean="0"/>
+              <a:t>Provisioning Azure Resources using Azure CLI</a:t>
+            </a:r>
+            <a:endParaRPr lang="en-GB" dirty="0" smtClean="0"/>
+          </a:p>
+          <a:p>
+            <a:pPr marL="742950" indent="-742950">
+              <a:buFont typeface="+mj-lt"/>
+              <a:buAutoNum type="arabicParenR"/>
+            </a:pPr>
+            <a:r>
+              <a:rPr lang="en-GB" dirty="0" smtClean="0"/>
+              <a:t>Deploying to Azure with Visual Studio</a:t>
+            </a:r>
+          </a:p>
+          <a:p>
+            <a:pPr marL="742950" indent="-742950">
+              <a:buFont typeface="+mj-lt"/>
+              <a:buAutoNum type="arabicParenR"/>
+            </a:pPr>
+            <a:r>
+              <a:rPr lang="en-GB" dirty="0" smtClean="0"/>
+              <a:t>Deploying to Azure with GitHub</a:t>
+            </a:r>
+          </a:p>
+          <a:p>
+            <a:pPr marL="742950" indent="-742950">
+              <a:buFont typeface="+mj-lt"/>
+              <a:buAutoNum type="arabicParenR"/>
+            </a:pPr>
+            <a:r>
+              <a:rPr lang="en-US" dirty="0"/>
+              <a:t>Remote </a:t>
+            </a:r>
+            <a:r>
+              <a:rPr lang="en-US" dirty="0" smtClean="0"/>
+              <a:t>debugging with </a:t>
+            </a:r>
+            <a:r>
+              <a:rPr lang="en-US" dirty="0"/>
+              <a:t>Visual Studio</a:t>
+            </a:r>
+            <a:endParaRPr lang="en-GB" dirty="0" smtClean="0"/>
+          </a:p>
+        </p:txBody>
+      </p:sp>
+    </p:spTree>
+    <p:extLst>
+      <p:ext uri="{BB962C8B-B14F-4D97-AF65-F5344CB8AC3E}">
+        <p14:creationId xmlns:p14="http://schemas.microsoft.com/office/powerpoint/2010/main" val="3139541906"/>
+      </p:ext>
+    </p:extLst>
+  </p:cSld>
+  <p:clrMapOvr>
+    <a:masterClrMapping/>
+  </p:clrMapOvr>
+  <mc:AlternateContent xmlns:mc="http://schemas.openxmlformats.org/markup-compatibility/2006" xmlns:p14="http://schemas.microsoft.com/office/powerpoint/2010/main">
+    <mc:Choice Requires="p14">
+      <p:transition spd="med" p14:dur="700">
+        <p:fade/>
+      </p:transition>
+    </mc:Choice>
+    <mc:Fallback xmlns="">
+      <p:transition spd="med">
+        <p:fade/>
+      </p:transition>
+    </mc:Fallback>
+  </mc:AlternateContent>
+  <p:timing>
+    <p:tnLst>
+      <p:par>
+        <p:cTn id="1" dur="indefinite" restart="never" nodeType="tmRoot"/>
+      </p:par>
+    </p:tnLst>
+  </p:timing>
+</p:sld>
+</file>
+
+<file path=ppt/slides/slide20.xml><?xml version="1.0" encoding="utf-8"?>
 <p:sld xmlns:a="http://schemas.openxmlformats.org/drawingml/2006/main" xmlns:r="http://schemas.openxmlformats.org/officeDocument/2006/relationships" xmlns:p="http://schemas.openxmlformats.org/presentationml/2006/main">
   <p:cSld>
     <p:spTree>
@@ -19839,7 +20901,7 @@
 </p:sld>
 </file>
 
-<file path=ppt/slides/slide16.xml><?xml version="1.0" encoding="utf-8"?>
+<file path=ppt/slides/slide21.xml><?xml version="1.0" encoding="utf-8"?>
 <p:sld xmlns:a="http://schemas.openxmlformats.org/drawingml/2006/main" xmlns:r="http://schemas.openxmlformats.org/officeDocument/2006/relationships" xmlns:p="http://schemas.openxmlformats.org/presentationml/2006/main">
   <p:cSld>
     <p:spTree>
@@ -19911,7 +20973,7 @@
 </p:sld>
 </file>
 
-<file path=ppt/slides/slide17.xml><?xml version="1.0" encoding="utf-8"?>
+<file path=ppt/slides/slide22.xml><?xml version="1.0" encoding="utf-8"?>
 <p:sld xmlns:a="http://schemas.openxmlformats.org/drawingml/2006/main" xmlns:r="http://schemas.openxmlformats.org/officeDocument/2006/relationships" xmlns:p="http://schemas.openxmlformats.org/presentationml/2006/main">
   <p:cSld>
     <p:spTree>
@@ -20684,7 +21746,7 @@
 </p:sld>
 </file>
 
-<file path=ppt/slides/slide18.xml><?xml version="1.0" encoding="utf-8"?>
+<file path=ppt/slides/slide23.xml><?xml version="1.0" encoding="utf-8"?>
 <p:sld xmlns:a="http://schemas.openxmlformats.org/drawingml/2006/main" xmlns:r="http://schemas.openxmlformats.org/officeDocument/2006/relationships" xmlns:p="http://schemas.openxmlformats.org/presentationml/2006/main">
   <p:cSld>
     <p:spTree>
@@ -20705,149 +21767,6 @@
     <p:extLst>
       <p:ext uri="{BB962C8B-B14F-4D97-AF65-F5344CB8AC3E}">
         <p14:creationId xmlns:p14="http://schemas.microsoft.com/office/powerpoint/2010/main" val="3149604782"/>
-      </p:ext>
-    </p:extLst>
-  </p:cSld>
-  <p:clrMapOvr>
-    <a:masterClrMapping/>
-  </p:clrMapOvr>
-  <mc:AlternateContent xmlns:mc="http://schemas.openxmlformats.org/markup-compatibility/2006" xmlns:p14="http://schemas.microsoft.com/office/powerpoint/2010/main">
-    <mc:Choice Requires="p14">
-      <p:transition spd="med" p14:dur="700">
-        <p:fade/>
-      </p:transition>
-    </mc:Choice>
-    <mc:Fallback xmlns="">
-      <p:transition spd="med">
-        <p:fade/>
-      </p:transition>
-    </mc:Fallback>
-  </mc:AlternateContent>
-  <p:timing>
-    <p:tnLst>
-      <p:par>
-        <p:cTn id="1" dur="indefinite" restart="never" nodeType="tmRoot"/>
-      </p:par>
-    </p:tnLst>
-  </p:timing>
-</p:sld>
-</file>
-
-<file path=ppt/slides/slide2.xml><?xml version="1.0" encoding="utf-8"?>
-<p:sld xmlns:a="http://schemas.openxmlformats.org/drawingml/2006/main" xmlns:r="http://schemas.openxmlformats.org/officeDocument/2006/relationships" xmlns:p="http://schemas.openxmlformats.org/presentationml/2006/main">
-  <p:cSld>
-    <p:spTree>
-      <p:nvGrpSpPr>
-        <p:cNvPr id="1" name=""/>
-        <p:cNvGrpSpPr/>
-        <p:nvPr/>
-      </p:nvGrpSpPr>
-      <p:grpSpPr>
-        <a:xfrm>
-          <a:off x="0" y="0"/>
-          <a:ext cx="0" cy="0"/>
-          <a:chOff x="0" y="0"/>
-          <a:chExt cx="0" cy="0"/>
-        </a:xfrm>
-      </p:grpSpPr>
-      <p:sp>
-        <p:nvSpPr>
-          <p:cNvPr id="2" name="Title 1"/>
-          <p:cNvSpPr>
-            <a:spLocks noGrp="1"/>
-          </p:cNvSpPr>
-          <p:nvPr>
-            <p:ph type="title"/>
-          </p:nvPr>
-        </p:nvSpPr>
-        <p:spPr/>
-        <p:txBody>
-          <a:bodyPr/>
-          <a:lstStyle/>
-          <a:p>
-            <a:r>
-              <a:rPr lang="en-US" smtClean="0"/>
-              <a:t>Agenda</a:t>
-            </a:r>
-            <a:endParaRPr lang="en-US" dirty="0"/>
-          </a:p>
-        </p:txBody>
-      </p:sp>
-      <p:sp>
-        <p:nvSpPr>
-          <p:cNvPr id="7" name="Content Placeholder 6"/>
-          <p:cNvSpPr>
-            <a:spLocks noGrp="1"/>
-          </p:cNvSpPr>
-          <p:nvPr>
-            <p:ph idx="1"/>
-          </p:nvPr>
-        </p:nvSpPr>
-        <p:spPr/>
-        <p:txBody>
-          <a:bodyPr>
-            <a:normAutofit/>
-          </a:bodyPr>
-          <a:lstStyle/>
-          <a:p>
-            <a:pPr marL="742950" indent="-742950">
-              <a:buFont typeface="+mj-lt"/>
-              <a:buAutoNum type="arabicParenR"/>
-            </a:pPr>
-            <a:r>
-              <a:rPr lang="en-GB" dirty="0" smtClean="0"/>
-              <a:t>Azure Web Apps Overview</a:t>
-            </a:r>
-          </a:p>
-          <a:p>
-            <a:pPr marL="742950" indent="-742950">
-              <a:buFont typeface="+mj-lt"/>
-              <a:buAutoNum type="arabicParenR"/>
-            </a:pPr>
-            <a:r>
-              <a:rPr lang="en-GB" dirty="0" smtClean="0"/>
-              <a:t>Deploying </a:t>
-            </a:r>
-            <a:r>
-              <a:rPr lang="en-GB" dirty="0" smtClean="0"/>
-              <a:t>to Azure with Visual Studio</a:t>
-            </a:r>
-          </a:p>
-          <a:p>
-            <a:pPr marL="742950" indent="-742950">
-              <a:buFont typeface="+mj-lt"/>
-              <a:buAutoNum type="arabicParenR"/>
-            </a:pPr>
-            <a:r>
-              <a:rPr lang="en-GB" dirty="0" smtClean="0"/>
-              <a:t>Deploying to Azure with GitHub</a:t>
-            </a:r>
-          </a:p>
-          <a:p>
-            <a:pPr marL="742950" indent="-742950">
-              <a:buFont typeface="+mj-lt"/>
-              <a:buAutoNum type="arabicParenR"/>
-            </a:pPr>
-            <a:r>
-              <a:rPr lang="en-US" dirty="0"/>
-              <a:t>Remote </a:t>
-            </a:r>
-            <a:r>
-              <a:rPr lang="en-US" dirty="0" smtClean="0"/>
-              <a:t>debugging with </a:t>
-            </a:r>
-            <a:r>
-              <a:rPr lang="en-US" dirty="0"/>
-              <a:t>Visual Studio</a:t>
-            </a:r>
-            <a:endParaRPr lang="en-GB" dirty="0" smtClean="0"/>
-          </a:p>
-        </p:txBody>
-      </p:sp>
-    </p:spTree>
-    <p:extLst>
-      <p:ext uri="{BB962C8B-B14F-4D97-AF65-F5344CB8AC3E}">
-        <p14:creationId xmlns:p14="http://schemas.microsoft.com/office/powerpoint/2010/main" val="3139541906"/>
       </p:ext>
     </p:extLst>
   </p:cSld>
@@ -22387,15 +23306,7 @@
           <a:p>
             <a:r>
               <a:rPr lang="en-US" dirty="0" smtClean="0"/>
-              <a:t>Easy to deploy a variety of different web </a:t>
-            </a:r>
-            <a:r>
-              <a:rPr lang="en-US" dirty="0" smtClean="0"/>
-              <a:t>sites: </a:t>
-            </a:r>
-            <a:r>
-              <a:rPr lang="en-US" dirty="0" smtClean="0"/>
-              <a:t>node, python, </a:t>
+              <a:t>Easy to deploy a variety of different web sites: node, python, </a:t>
             </a:r>
             <a:r>
               <a:rPr lang="en-US" dirty="0" err="1" smtClean="0"/>
@@ -22409,24 +23320,14 @@
           <a:p>
             <a:r>
               <a:rPr lang="en-US" dirty="0" smtClean="0"/>
-              <a:t>Can install some software from the gallery like WordPress or preconfigured stacks </a:t>
-            </a:r>
+              <a:t>Can install some software from the gallery like WordPress or preconfigured stacks (MEAN stack)</a:t>
+            </a:r>
+          </a:p>
+          <a:p>
             <a:r>
               <a:rPr lang="en-US" dirty="0" smtClean="0"/>
-              <a:t>(MEAN stack)</a:t>
-            </a:r>
-            <a:endParaRPr lang="en-US" dirty="0" smtClean="0"/>
-          </a:p>
-          <a:p>
-            <a:r>
-              <a:rPr lang="en-US" dirty="0" smtClean="0"/>
-              <a:t>Has a few limitations such as cannot configure ports, compile native modules for </a:t>
-            </a:r>
-            <a:r>
-              <a:rPr lang="en-US" dirty="0" smtClean="0"/>
-              <a:t>Node</a:t>
-            </a:r>
-            <a:endParaRPr lang="en-US" dirty="0" smtClean="0"/>
+              <a:t>Has a few limitations such as cannot configure ports, compile native modules for Node</a:t>
+            </a:r>
           </a:p>
         </p:txBody>
       </p:sp>
@@ -22537,13 +23438,8 @@
           <a:p>
             <a:r>
               <a:rPr lang="en-US" dirty="0" smtClean="0"/>
-              <a:t>Ideal for a production / staging </a:t>
-            </a:r>
-            <a:r>
-              <a:rPr lang="en-US" dirty="0" smtClean="0"/>
-              <a:t>environment</a:t>
-            </a:r>
-            <a:endParaRPr lang="en-US" dirty="0" smtClean="0"/>
+              <a:t>Ideal for a production / staging environment</a:t>
+            </a:r>
           </a:p>
           <a:p>
             <a:endParaRPr lang="en-US" dirty="0"/>
@@ -22617,24 +23513,10 @@
           <a:lstStyle/>
           <a:p>
             <a:r>
-              <a:rPr lang="en-US" dirty="0"/>
-              <a:t>Deploying to </a:t>
-            </a:r>
-            <a:r>
               <a:rPr lang="en-US" dirty="0" smtClean="0"/>
-              <a:t>Azure</a:t>
-            </a:r>
-            <a:br>
-              <a:rPr lang="en-US" dirty="0" smtClean="0"/>
-            </a:br>
-            <a:r>
-              <a:rPr lang="en-US" dirty="0" smtClean="0"/>
-              <a:t>with Visual </a:t>
-            </a:r>
-            <a:r>
-              <a:rPr lang="en-US" dirty="0"/>
-              <a:t>Studio</a:t>
-            </a:r>
+              <a:t>Provisioning Azure Resources using Azure CLI</a:t>
+            </a:r>
+            <a:endParaRPr lang="en-US" dirty="0"/>
           </a:p>
         </p:txBody>
       </p:sp>
@@ -22689,7 +23571,7 @@
       </p:grpSpPr>
       <p:sp>
         <p:nvSpPr>
-          <p:cNvPr id="3" name="Title 2"/>
+          <p:cNvPr id="2" name="Title 1"/>
           <p:cNvSpPr>
             <a:spLocks noGrp="1"/>
           </p:cNvSpPr>
@@ -22699,26 +23581,24 @@
         </p:nvSpPr>
         <p:spPr/>
         <p:txBody>
-          <a:bodyPr anchor="ctr">
-            <a:normAutofit fontScale="90000"/>
-          </a:bodyPr>
+          <a:bodyPr/>
           <a:lstStyle/>
           <a:p>
-            <a:pPr marL="252000">
-              <a:spcBef>
-                <a:spcPts val="0"/>
-              </a:spcBef>
-            </a:pPr>
-            <a:r>
-              <a:rPr lang="en-US" dirty="0"/>
-              <a:t>Visual Studio + App Service Web Apps</a:t>
-            </a:r>
+            <a:r>
+              <a:rPr lang="en-US" dirty="0" smtClean="0"/>
+              <a:t>Azure </a:t>
+            </a:r>
+            <a:r>
+              <a:rPr lang="en-US" dirty="0" smtClean="0"/>
+              <a:t>CLI</a:t>
+            </a:r>
+            <a:endParaRPr lang="en-US" dirty="0"/>
           </a:p>
         </p:txBody>
       </p:sp>
       <p:sp>
         <p:nvSpPr>
-          <p:cNvPr id="4" name="Content Placeholder 3"/>
+          <p:cNvPr id="3" name="Content Placeholder 2"/>
           <p:cNvSpPr>
             <a:spLocks noGrp="1"/>
           </p:cNvSpPr>
@@ -22728,296 +23608,111 @@
         </p:nvSpPr>
         <p:spPr/>
         <p:txBody>
-          <a:bodyPr/>
+          <a:bodyPr>
+            <a:normAutofit/>
+          </a:bodyPr>
           <a:lstStyle/>
           <a:p>
-            <a:pPr marL="0" indent="0">
+            <a:r>
+              <a:rPr lang="en-US" dirty="0" smtClean="0"/>
+              <a:t>Cross-platform </a:t>
+            </a:r>
+            <a:r>
+              <a:rPr lang="en-US" dirty="0"/>
+              <a:t>command line interface to develop, deploy and manage Microsoft Azure applications</a:t>
+            </a:r>
+          </a:p>
+          <a:p>
+            <a:r>
+              <a:rPr lang="en-US" dirty="0" smtClean="0"/>
+              <a:t>Runs </a:t>
+            </a:r>
+            <a:r>
+              <a:rPr lang="en-US" dirty="0"/>
+              <a:t>on Node.js. It's installed using </a:t>
+            </a:r>
+            <a:r>
+              <a:rPr lang="en-US" dirty="0" err="1"/>
+              <a:t>npm</a:t>
+            </a:r>
+            <a:r>
+              <a:rPr lang="en-US" dirty="0"/>
+              <a:t> package </a:t>
+            </a:r>
+            <a:endParaRPr lang="en-US" dirty="0" smtClean="0"/>
+          </a:p>
+          <a:p>
+            <a:pPr marL="457200" lvl="1" indent="0">
               <a:buNone/>
             </a:pPr>
             <a:r>
-              <a:rPr lang="en-US" sz="3200" dirty="0">
-                <a:solidFill>
-                  <a:schemeClr val="tx1"/>
-                </a:solidFill>
+              <a:rPr lang="de-DE" dirty="0" smtClean="0">
+                <a:latin typeface="Courier New" panose="02070309020205020404" pitchFamily="49" charset="0"/>
+                <a:cs typeface="Courier New" panose="02070309020205020404" pitchFamily="49" charset="0"/>
               </a:rPr>
-              <a:t>Create Azure Resources during File / New</a:t>
-            </a:r>
-          </a:p>
-          <a:p>
-            <a:pPr marL="0" indent="0">
-              <a:buNone/>
-            </a:pPr>
-            <a:r>
-              <a:rPr lang="en-US" sz="3200" dirty="0">
-                <a:solidFill>
-                  <a:schemeClr val="tx1"/>
-                </a:solidFill>
+              <a:t>manager </a:t>
+            </a:r>
+            <a:r>
+              <a:rPr lang="de-DE" dirty="0">
+                <a:latin typeface="Courier New" panose="02070309020205020404" pitchFamily="49" charset="0"/>
+                <a:cs typeface="Courier New" panose="02070309020205020404" pitchFamily="49" charset="0"/>
               </a:rPr>
-              <a:t>Create Web App during deploy</a:t>
-            </a:r>
-          </a:p>
-          <a:p>
-            <a:pPr marL="0" indent="0">
-              <a:buNone/>
-            </a:pPr>
-            <a:r>
-              <a:rPr lang="en-US" sz="3200" dirty="0">
-                <a:solidFill>
-                  <a:schemeClr val="tx1"/>
-                </a:solidFill>
+              <a:t>npm install -g azure-cli</a:t>
+            </a:r>
+            <a:r>
+              <a:rPr lang="en-US" dirty="0" smtClean="0">
+                <a:latin typeface="Courier New" panose="02070309020205020404" pitchFamily="49" charset="0"/>
+                <a:cs typeface="Courier New" panose="02070309020205020404" pitchFamily="49" charset="0"/>
               </a:rPr>
-              <a:t>Manage with Server Explorer</a:t>
-            </a:r>
-          </a:p>
-          <a:p>
-            <a:pPr marL="0" indent="0">
-              <a:buNone/>
-            </a:pPr>
-            <a:endParaRPr lang="en-US" sz="3200" dirty="0">
-              <a:solidFill>
-                <a:schemeClr val="tx1"/>
-              </a:solidFill>
+              <a:t> </a:t>
+            </a:r>
+            <a:endParaRPr lang="en-US" dirty="0">
+              <a:latin typeface="Courier New" panose="02070309020205020404" pitchFamily="49" charset="0"/>
+              <a:cs typeface="Courier New" panose="02070309020205020404" pitchFamily="49" charset="0"/>
             </a:endParaRPr>
+          </a:p>
+          <a:p>
+            <a:r>
+              <a:rPr lang="en-US" dirty="0" smtClean="0"/>
+              <a:t>Works </a:t>
+            </a:r>
+            <a:r>
+              <a:rPr lang="en-US" dirty="0"/>
+              <a:t>in one of two modes </a:t>
+            </a:r>
+            <a:endParaRPr lang="en-US" dirty="0" smtClean="0"/>
+          </a:p>
+          <a:p>
+            <a:pPr lvl="1"/>
+            <a:r>
+              <a:rPr lang="en-US" dirty="0" smtClean="0"/>
+              <a:t>Service </a:t>
+            </a:r>
+            <a:r>
+              <a:rPr lang="en-US" dirty="0"/>
+              <a:t>management: Azure service management API</a:t>
+            </a:r>
+          </a:p>
+          <a:p>
+            <a:pPr lvl="1"/>
+            <a:r>
+              <a:rPr lang="en-US" dirty="0" smtClean="0"/>
+              <a:t>Resource </a:t>
+            </a:r>
+            <a:r>
+              <a:rPr lang="en-US" dirty="0"/>
+              <a:t>manager: Azure Resource Manager API</a:t>
+            </a:r>
+          </a:p>
+          <a:p>
+            <a:endParaRPr lang="en-US" dirty="0"/>
           </a:p>
         </p:txBody>
       </p:sp>
-      <p:sp>
-        <p:nvSpPr>
-          <p:cNvPr id="6" name="Content Placeholder 2"/>
-          <p:cNvSpPr txBox="1">
-            <a:spLocks/>
-          </p:cNvSpPr>
-          <p:nvPr/>
-        </p:nvSpPr>
-        <p:spPr>
-          <a:xfrm>
-            <a:off x="274712" y="441435"/>
-            <a:ext cx="12192000" cy="5266267"/>
-          </a:xfrm>
-          <a:prstGeom prst="rect">
-            <a:avLst/>
-          </a:prstGeom>
-        </p:spPr>
-        <p:txBody>
-          <a:bodyPr vert="horz" lIns="91440" tIns="45720" rIns="91440" bIns="45720" rtlCol="0" anchor="ctr">
-            <a:noAutofit/>
-          </a:bodyPr>
-          <a:lstStyle>
-            <a:lvl1pPr marL="228600" indent="-228600" algn="l" defTabSz="914400" rtl="0" eaLnBrk="1" latinLnBrk="0" hangingPunct="1">
-              <a:lnSpc>
-                <a:spcPct val="90000"/>
-              </a:lnSpc>
-              <a:spcBef>
-                <a:spcPts val="1000"/>
-              </a:spcBef>
-              <a:buFont typeface="Arial" panose="020B0604020202020204" pitchFamily="34" charset="0"/>
-              <a:buChar char="•"/>
-              <a:defRPr sz="3600" kern="1200">
-                <a:solidFill>
-                  <a:schemeClr val="bg1"/>
-                </a:solidFill>
-                <a:latin typeface="+mn-lt"/>
-                <a:ea typeface="+mn-ea"/>
-                <a:cs typeface="+mn-cs"/>
-              </a:defRPr>
-            </a:lvl1pPr>
-            <a:lvl2pPr marL="685800" indent="-228600" algn="l" defTabSz="914400" rtl="0" eaLnBrk="1" latinLnBrk="0" hangingPunct="1">
-              <a:lnSpc>
-                <a:spcPct val="90000"/>
-              </a:lnSpc>
-              <a:spcBef>
-                <a:spcPts val="500"/>
-              </a:spcBef>
-              <a:buFont typeface="Arial" panose="020B0604020202020204" pitchFamily="34" charset="0"/>
-              <a:buChar char="•"/>
-              <a:defRPr sz="3200" kern="1200">
-                <a:solidFill>
-                  <a:schemeClr val="bg1"/>
-                </a:solidFill>
-                <a:latin typeface="+mn-lt"/>
-                <a:ea typeface="+mn-ea"/>
-                <a:cs typeface="+mn-cs"/>
-              </a:defRPr>
-            </a:lvl2pPr>
-            <a:lvl3pPr marL="1143000" indent="-228600" algn="l" defTabSz="914400" rtl="0" eaLnBrk="1" latinLnBrk="0" hangingPunct="1">
-              <a:lnSpc>
-                <a:spcPct val="90000"/>
-              </a:lnSpc>
-              <a:spcBef>
-                <a:spcPts val="500"/>
-              </a:spcBef>
-              <a:buFont typeface="Arial" panose="020B0604020202020204" pitchFamily="34" charset="0"/>
-              <a:buChar char="•"/>
-              <a:defRPr sz="2800" kern="1200">
-                <a:solidFill>
-                  <a:schemeClr val="bg1"/>
-                </a:solidFill>
-                <a:latin typeface="+mn-lt"/>
-                <a:ea typeface="+mn-ea"/>
-                <a:cs typeface="+mn-cs"/>
-              </a:defRPr>
-            </a:lvl3pPr>
-            <a:lvl4pPr marL="1600200" indent="-228600" algn="l" defTabSz="914400" rtl="0" eaLnBrk="1" latinLnBrk="0" hangingPunct="1">
-              <a:lnSpc>
-                <a:spcPct val="90000"/>
-              </a:lnSpc>
-              <a:spcBef>
-                <a:spcPts val="500"/>
-              </a:spcBef>
-              <a:buFont typeface="Arial" panose="020B0604020202020204" pitchFamily="34" charset="0"/>
-              <a:buChar char="•"/>
-              <a:defRPr sz="2400" kern="1200">
-                <a:solidFill>
-                  <a:schemeClr val="bg1"/>
-                </a:solidFill>
-                <a:latin typeface="+mn-lt"/>
-                <a:ea typeface="+mn-ea"/>
-                <a:cs typeface="+mn-cs"/>
-              </a:defRPr>
-            </a:lvl4pPr>
-            <a:lvl5pPr marL="2057400" indent="-228600" algn="l" defTabSz="914400" rtl="0" eaLnBrk="1" latinLnBrk="0" hangingPunct="1">
-              <a:lnSpc>
-                <a:spcPct val="90000"/>
-              </a:lnSpc>
-              <a:spcBef>
-                <a:spcPts val="500"/>
-              </a:spcBef>
-              <a:buFont typeface="Arial" panose="020B0604020202020204" pitchFamily="34" charset="0"/>
-              <a:buChar char="•"/>
-              <a:defRPr sz="2400" kern="1200">
-                <a:solidFill>
-                  <a:schemeClr val="bg1"/>
-                </a:solidFill>
-                <a:latin typeface="+mn-lt"/>
-                <a:ea typeface="+mn-ea"/>
-                <a:cs typeface="+mn-cs"/>
-              </a:defRPr>
-            </a:lvl5pPr>
-            <a:lvl6pPr marL="2514600" indent="-228600" algn="l" defTabSz="914400" rtl="0" eaLnBrk="1" latinLnBrk="0" hangingPunct="1">
-              <a:lnSpc>
-                <a:spcPct val="90000"/>
-              </a:lnSpc>
-              <a:spcBef>
-                <a:spcPts val="500"/>
-              </a:spcBef>
-              <a:buFont typeface="Arial" panose="020B0604020202020204" pitchFamily="34" charset="0"/>
-              <a:buChar char="•"/>
-              <a:defRPr sz="1800" kern="1200">
-                <a:solidFill>
-                  <a:schemeClr val="tx1"/>
-                </a:solidFill>
-                <a:latin typeface="+mn-lt"/>
-                <a:ea typeface="+mn-ea"/>
-                <a:cs typeface="+mn-cs"/>
-              </a:defRPr>
-            </a:lvl6pPr>
-            <a:lvl7pPr marL="2971800" indent="-228600" algn="l" defTabSz="914400" rtl="0" eaLnBrk="1" latinLnBrk="0" hangingPunct="1">
-              <a:lnSpc>
-                <a:spcPct val="90000"/>
-              </a:lnSpc>
-              <a:spcBef>
-                <a:spcPts val="500"/>
-              </a:spcBef>
-              <a:buFont typeface="Arial" panose="020B0604020202020204" pitchFamily="34" charset="0"/>
-              <a:buChar char="•"/>
-              <a:defRPr sz="1800" kern="1200">
-                <a:solidFill>
-                  <a:schemeClr val="tx1"/>
-                </a:solidFill>
-                <a:latin typeface="+mn-lt"/>
-                <a:ea typeface="+mn-ea"/>
-                <a:cs typeface="+mn-cs"/>
-              </a:defRPr>
-            </a:lvl7pPr>
-            <a:lvl8pPr marL="3429000" indent="-228600" algn="l" defTabSz="914400" rtl="0" eaLnBrk="1" latinLnBrk="0" hangingPunct="1">
-              <a:lnSpc>
-                <a:spcPct val="90000"/>
-              </a:lnSpc>
-              <a:spcBef>
-                <a:spcPts val="500"/>
-              </a:spcBef>
-              <a:buFont typeface="Arial" panose="020B0604020202020204" pitchFamily="34" charset="0"/>
-              <a:buChar char="•"/>
-              <a:defRPr sz="1800" kern="1200">
-                <a:solidFill>
-                  <a:schemeClr val="tx1"/>
-                </a:solidFill>
-                <a:latin typeface="+mn-lt"/>
-                <a:ea typeface="+mn-ea"/>
-                <a:cs typeface="+mn-cs"/>
-              </a:defRPr>
-            </a:lvl8pPr>
-            <a:lvl9pPr marL="3886200" indent="-228600" algn="l" defTabSz="914400" rtl="0" eaLnBrk="1" latinLnBrk="0" hangingPunct="1">
-              <a:lnSpc>
-                <a:spcPct val="90000"/>
-              </a:lnSpc>
-              <a:spcBef>
-                <a:spcPts val="500"/>
-              </a:spcBef>
-              <a:buFont typeface="Arial" panose="020B0604020202020204" pitchFamily="34" charset="0"/>
-              <a:buChar char="•"/>
-              <a:defRPr sz="1800" kern="1200">
-                <a:solidFill>
-                  <a:schemeClr val="tx1"/>
-                </a:solidFill>
-                <a:latin typeface="+mn-lt"/>
-                <a:ea typeface="+mn-ea"/>
-                <a:cs typeface="+mn-cs"/>
-              </a:defRPr>
-            </a:lvl9pPr>
-          </a:lstStyle>
-          <a:p>
-            <a:pPr marL="252000" indent="0">
-              <a:spcBef>
-                <a:spcPts val="0"/>
-              </a:spcBef>
-              <a:spcAft>
-                <a:spcPts val="1800"/>
-              </a:spcAft>
-              <a:buNone/>
-            </a:pPr>
-            <a:endParaRPr lang="en-US" dirty="0">
-              <a:solidFill>
-                <a:schemeClr val="tx1"/>
-              </a:solidFill>
-            </a:endParaRPr>
-          </a:p>
-        </p:txBody>
-      </p:sp>
-      <p:pic>
-        <p:nvPicPr>
-          <p:cNvPr id="7" name="Content Placeholder 4"/>
-          <p:cNvPicPr>
-            <a:picLocks noChangeAspect="1"/>
-          </p:cNvPicPr>
-          <p:nvPr/>
-        </p:nvPicPr>
-        <p:blipFill>
-          <a:blip r:embed="rId2" cstate="email">
-            <a:extLst>
-              <a:ext uri="{28A0092B-C50C-407E-A947-70E740481C1C}">
-                <a14:useLocalDpi xmlns:a14="http://schemas.microsoft.com/office/drawing/2010/main" val="0"/>
-              </a:ext>
-            </a:extLst>
-          </a:blip>
-          <a:stretch>
-            <a:fillRect/>
-          </a:stretch>
-        </p:blipFill>
-        <p:spPr>
-          <a:xfrm>
-            <a:off x="7530127" y="3373187"/>
-            <a:ext cx="4110493" cy="2719388"/>
-          </a:xfrm>
-          <a:prstGeom prst="rect">
-            <a:avLst/>
-          </a:prstGeom>
-        </p:spPr>
-      </p:pic>
     </p:spTree>
     <p:extLst>
       <p:ext uri="{BB962C8B-B14F-4D97-AF65-F5344CB8AC3E}">
-        <p14:creationId xmlns:p14="http://schemas.microsoft.com/office/powerpoint/2010/main" val="1239248924"/>
+        <p14:creationId xmlns:p14="http://schemas.microsoft.com/office/powerpoint/2010/main" val="2972335047"/>
       </p:ext>
     </p:extLst>
   </p:cSld>
@@ -23065,30 +23760,75 @@
       </p:grpSpPr>
       <p:sp>
         <p:nvSpPr>
-          <p:cNvPr id="3" name="Subtitle 2"/>
+          <p:cNvPr id="2" name="Title 1"/>
           <p:cNvSpPr>
             <a:spLocks noGrp="1"/>
           </p:cNvSpPr>
           <p:nvPr>
-            <p:ph type="subTitle" idx="1"/>
+            <p:ph type="title"/>
           </p:nvPr>
         </p:nvSpPr>
         <p:spPr/>
         <p:txBody>
-          <a:bodyPr/>
+          <a:bodyPr>
+            <a:normAutofit fontScale="90000"/>
+          </a:bodyPr>
           <a:lstStyle/>
           <a:p>
             <a:r>
               <a:rPr lang="en-US" dirty="0"/>
-              <a:t>Deploying to Azure with Visual Studio</a:t>
-            </a:r>
+              <a:t>Azure CLI with Azure Resource Manager</a:t>
+            </a:r>
+            <a:endParaRPr lang="en-US" dirty="0"/>
+          </a:p>
+        </p:txBody>
+      </p:sp>
+      <p:sp>
+        <p:nvSpPr>
+          <p:cNvPr id="3" name="Content Placeholder 2"/>
+          <p:cNvSpPr>
+            <a:spLocks noGrp="1"/>
+          </p:cNvSpPr>
+          <p:nvPr>
+            <p:ph idx="1"/>
+          </p:nvPr>
+        </p:nvSpPr>
+        <p:spPr/>
+        <p:txBody>
+          <a:bodyPr>
+            <a:normAutofit/>
+          </a:bodyPr>
+          <a:lstStyle/>
+          <a:p>
+            <a:r>
+              <a:rPr lang="en-US" dirty="0"/>
+              <a:t>Deploy, manage, and monitor the solution resources as a group, rather than handling them individually</a:t>
+            </a:r>
+            <a:endParaRPr lang="en-US" dirty="0"/>
+          </a:p>
+          <a:p>
+            <a:r>
+              <a:rPr lang="en-US" dirty="0"/>
+              <a:t>Use declarative templates to define the solution </a:t>
+            </a:r>
+            <a:r>
+              <a:rPr lang="en-US" dirty="0" smtClean="0"/>
+              <a:t>deployment</a:t>
+            </a:r>
+          </a:p>
+          <a:p>
+            <a:r>
+              <a:rPr lang="en-US" dirty="0"/>
+              <a:t>Define the dependencies between resources so they are deployed in the correct order</a:t>
+            </a:r>
+            <a:endParaRPr lang="en-US" dirty="0"/>
           </a:p>
         </p:txBody>
       </p:sp>
     </p:spTree>
     <p:extLst>
       <p:ext uri="{BB962C8B-B14F-4D97-AF65-F5344CB8AC3E}">
-        <p14:creationId xmlns:p14="http://schemas.microsoft.com/office/powerpoint/2010/main" val="2548092044"/>
+        <p14:creationId xmlns:p14="http://schemas.microsoft.com/office/powerpoint/2010/main" val="1081355085"/>
       </p:ext>
     </p:extLst>
   </p:cSld>
@@ -25140,6 +25880,21 @@
 </file>
 
 <file path=customXml/item1.xml><?xml version="1.0" encoding="utf-8"?>
+<?mso-contentType ?>
+<FormTemplates xmlns="http://schemas.microsoft.com/sharepoint/v3/contenttype/forms">
+  <Display>DocumentLibraryForm</Display>
+  <Edit>DocumentLibraryForm</Edit>
+  <New>DocumentLibraryForm</New>
+</FormTemplates>
+</file>
+
+<file path=customXml/item2.xml><?xml version="1.0" encoding="utf-8"?>
+<p:properties xmlns:p="http://schemas.microsoft.com/office/2006/metadata/properties" xmlns:xsi="http://www.w3.org/2001/XMLSchema-instance" xmlns:pc="http://schemas.microsoft.com/office/infopath/2007/PartnerControls">
+  <documentManagement/>
+</p:properties>
+</file>
+
+<file path=customXml/item3.xml><?xml version="1.0" encoding="utf-8"?>
 <ct:contentTypeSchema xmlns:ct="http://schemas.microsoft.com/office/2006/metadata/contentType" xmlns:ma="http://schemas.microsoft.com/office/2006/metadata/properties/metaAttributes" ct:_="" ma:_="" ma:contentTypeName="Document" ma:contentTypeID="0x010100391E57C78B9F604FB8BAD296D1460E2A" ma:contentTypeVersion="1" ma:contentTypeDescription="Create a new document." ma:contentTypeScope="" ma:versionID="fb382fe2362acd2155f454904f478e4d">
   <xsd:schema xmlns:xsd="http://www.w3.org/2001/XMLSchema" xmlns:xs="http://www.w3.org/2001/XMLSchema" xmlns:p="http://schemas.microsoft.com/office/2006/metadata/properties" xmlns:ns3="636b0322-90fb-440c-9cbc-22749e7231e9" targetNamespace="http://schemas.microsoft.com/office/2006/metadata/properties" ma:root="true" ma:fieldsID="b9887c63ce4710c1aeb75a5f03aecb69" ns3:_="">
     <xsd:import namespace="636b0322-90fb-440c-9cbc-22749e7231e9"/>
@@ -25279,35 +26034,10 @@
 </ct:contentTypeSchema>
 </file>
 
-<file path=customXml/item2.xml><?xml version="1.0" encoding="utf-8"?>
-<p:properties xmlns:p="http://schemas.microsoft.com/office/2006/metadata/properties" xmlns:xsi="http://www.w3.org/2001/XMLSchema-instance" xmlns:pc="http://schemas.microsoft.com/office/infopath/2007/PartnerControls">
-  <documentManagement/>
-</p:properties>
-</file>
-
-<file path=customXml/item3.xml><?xml version="1.0" encoding="utf-8"?>
-<?mso-contentType ?>
-<FormTemplates xmlns="http://schemas.microsoft.com/sharepoint/v3/contenttype/forms">
-  <Display>DocumentLibraryForm</Display>
-  <Edit>DocumentLibraryForm</Edit>
-  <New>DocumentLibraryForm</New>
-</FormTemplates>
-</file>
-
 <file path=customXml/itemProps1.xml><?xml version="1.0" encoding="utf-8"?>
-<ds:datastoreItem xmlns:ds="http://schemas.openxmlformats.org/officeDocument/2006/customXml" ds:itemID="{7B70CE0C-0988-423A-BF66-B40F6A1061FF}">
+<ds:datastoreItem xmlns:ds="http://schemas.openxmlformats.org/officeDocument/2006/customXml" ds:itemID="{B0CA13EC-1D3C-4D6F-8D1C-E8A452CFC79A}">
   <ds:schemaRefs>
-    <ds:schemaRef ds:uri="http://schemas.microsoft.com/office/2006/metadata/contentType"/>
-    <ds:schemaRef ds:uri="http://schemas.microsoft.com/office/2006/metadata/properties/metaAttributes"/>
-    <ds:schemaRef ds:uri="http://www.w3.org/2001/XMLSchema"/>
-    <ds:schemaRef ds:uri="http://schemas.microsoft.com/office/2006/metadata/properties"/>
-    <ds:schemaRef ds:uri="636b0322-90fb-440c-9cbc-22749e7231e9"/>
-    <ds:schemaRef ds:uri="http://schemas.microsoft.com/office/2006/documentManagement/types"/>
-    <ds:schemaRef ds:uri="http://schemas.microsoft.com/office/infopath/2007/PartnerControls"/>
-    <ds:schemaRef ds:uri="http://schemas.openxmlformats.org/package/2006/metadata/core-properties"/>
-    <ds:schemaRef ds:uri="http://purl.org/dc/elements/1.1/"/>
-    <ds:schemaRef ds:uri="http://purl.org/dc/terms/"/>
-    <ds:schemaRef ds:uri="http://schemas.microsoft.com/internal/obd"/>
+    <ds:schemaRef ds:uri="http://schemas.microsoft.com/sharepoint/v3/contenttype/forms"/>
   </ds:schemaRefs>
 </ds:datastoreItem>
 </file>
@@ -25329,9 +26059,19 @@
 </file>
 
 <file path=customXml/itemProps3.xml><?xml version="1.0" encoding="utf-8"?>
-<ds:datastoreItem xmlns:ds="http://schemas.openxmlformats.org/officeDocument/2006/customXml" ds:itemID="{B0CA13EC-1D3C-4D6F-8D1C-E8A452CFC79A}">
+<ds:datastoreItem xmlns:ds="http://schemas.openxmlformats.org/officeDocument/2006/customXml" ds:itemID="{7B70CE0C-0988-423A-BF66-B40F6A1061FF}">
   <ds:schemaRefs>
-    <ds:schemaRef ds:uri="http://schemas.microsoft.com/sharepoint/v3/contenttype/forms"/>
+    <ds:schemaRef ds:uri="http://schemas.microsoft.com/office/2006/metadata/contentType"/>
+    <ds:schemaRef ds:uri="http://schemas.microsoft.com/office/2006/metadata/properties/metaAttributes"/>
+    <ds:schemaRef ds:uri="http://www.w3.org/2001/XMLSchema"/>
+    <ds:schemaRef ds:uri="http://schemas.microsoft.com/office/2006/metadata/properties"/>
+    <ds:schemaRef ds:uri="636b0322-90fb-440c-9cbc-22749e7231e9"/>
+    <ds:schemaRef ds:uri="http://schemas.microsoft.com/office/2006/documentManagement/types"/>
+    <ds:schemaRef ds:uri="http://schemas.microsoft.com/office/infopath/2007/PartnerControls"/>
+    <ds:schemaRef ds:uri="http://schemas.openxmlformats.org/package/2006/metadata/core-properties"/>
+    <ds:schemaRef ds:uri="http://purl.org/dc/elements/1.1/"/>
+    <ds:schemaRef ds:uri="http://purl.org/dc/terms/"/>
+    <ds:schemaRef ds:uri="http://schemas.microsoft.com/internal/obd"/>
   </ds:schemaRefs>
 </ds:datastoreItem>
 </file>
</xml_diff>